<commit_message>
Only need to edit one slide
Edit generation of random network slides
</commit_message>
<xml_diff>
--- a/documents/presentations/LMUURS17_NEW.pptx
+++ b/documents/presentations/LMUURS17_NEW.pptx
@@ -5,7 +5,7 @@
     <p:sldMasterId id="2147483648" r:id="rId1"/>
   </p:sldMasterIdLst>
   <p:notesMasterIdLst>
-    <p:notesMasterId r:id="rId26"/>
+    <p:notesMasterId r:id="rId28"/>
   </p:notesMasterIdLst>
   <p:sldIdLst>
     <p:sldId id="256" r:id="rId2"/>
@@ -27,11 +27,13 @@
     <p:sldId id="294" r:id="rId18"/>
     <p:sldId id="291" r:id="rId19"/>
     <p:sldId id="287" r:id="rId20"/>
-    <p:sldId id="261" r:id="rId21"/>
-    <p:sldId id="293" r:id="rId22"/>
+    <p:sldId id="293" r:id="rId21"/>
+    <p:sldId id="261" r:id="rId22"/>
     <p:sldId id="271" r:id="rId23"/>
     <p:sldId id="280" r:id="rId24"/>
-    <p:sldId id="283" r:id="rId25"/>
+    <p:sldId id="296" r:id="rId25"/>
+    <p:sldId id="295" r:id="rId26"/>
+    <p:sldId id="283" r:id="rId27"/>
   </p:sldIdLst>
   <p:sldSz cx="12192000" cy="6858000"/>
   <p:notesSz cx="6858000" cy="9144000"/>
@@ -132,7 +134,7 @@
   </p:defaultTextStyle>
   <p:extLst>
     <p:ext uri="{EFAFB233-063F-42B5-8137-9DF3F51BA10A}">
-      <p15:sldGuideLst xmlns="" xmlns:p15="http://schemas.microsoft.com/office/powerpoint/2012/main"/>
+      <p15:sldGuideLst xmlns:p15="http://schemas.microsoft.com/office/powerpoint/2012/main" xmlns=""/>
     </p:ext>
   </p:extLst>
 </p:presentation>
@@ -151,6 +153,7 @@
       <c:style val="2"/>
     </mc:Fallback>
   </mc:AlternateContent>
+  <c:clrMapOvr bg1="lt1" tx1="dk1" bg2="lt2" tx2="dk2" accent1="accent1" accent2="accent2" accent3="accent3" accent4="accent4" accent5="accent5" accent6="accent6" hlink="hlink" folHlink="folHlink"/>
   <c:chart>
     <c:autoTitleDeleted val="0"/>
     <c:plotArea>
@@ -336,7 +339,7 @@
                   <c:v>1.493268683665407</c:v>
                 </c:pt>
                 <c:pt idx="10" formatCode="General">
-                  <c:v>1.431296312104374</c:v>
+                  <c:v>1.431296312104372</c:v>
                 </c:pt>
                 <c:pt idx="11" formatCode="General">
                   <c:v>1.520212753072462</c:v>
@@ -426,8 +429,8 @@
           <c:showBubbleSize val="0"/>
         </c:dLbls>
         <c:gapWidth val="219"/>
-        <c:axId val="2137791880"/>
-        <c:axId val="2137795576"/>
+        <c:axId val="2129203320"/>
+        <c:axId val="2129183656"/>
       </c:barChart>
       <c:lineChart>
         <c:grouping val="standard"/>
@@ -576,11 +579,11 @@
         </c:dLbls>
         <c:marker val="1"/>
         <c:smooth val="0"/>
-        <c:axId val="2137791880"/>
-        <c:axId val="2137795576"/>
+        <c:axId val="2129203320"/>
+        <c:axId val="2129183656"/>
       </c:lineChart>
       <c:catAx>
-        <c:axId val="2137791880"/>
+        <c:axId val="2129203320"/>
         <c:scaling>
           <c:orientation val="minMax"/>
         </c:scaling>
@@ -623,7 +626,7 @@
             <a:endParaRPr lang="en-US"/>
           </a:p>
         </c:txPr>
-        <c:crossAx val="2137795576"/>
+        <c:crossAx val="2129183656"/>
         <c:crosses val="autoZero"/>
         <c:auto val="1"/>
         <c:lblAlgn val="ctr"/>
@@ -631,7 +634,7 @@
         <c:noMultiLvlLbl val="0"/>
       </c:catAx>
       <c:valAx>
-        <c:axId val="2137795576"/>
+        <c:axId val="2129183656"/>
         <c:scaling>
           <c:orientation val="minMax"/>
           <c:min val="1.285"/>
@@ -683,7 +686,7 @@
             <a:endParaRPr lang="en-US"/>
           </a:p>
         </c:txPr>
-        <c:crossAx val="2137791880"/>
+        <c:crossAx val="2129203320"/>
         <c:crosses val="autoZero"/>
         <c:crossBetween val="between"/>
       </c:valAx>
@@ -724,7 +727,7 @@
       <a:endParaRPr lang="en-US"/>
     </a:p>
   </c:txPr>
-  <c:externalData r:id="rId1">
+  <c:externalData r:id="rId2">
     <c:autoUpdate val="0"/>
   </c:externalData>
 </c:chartSpace>
@@ -743,7 +746,6 @@
       <c:style val="2"/>
     </mc:Fallback>
   </mc:AlternateContent>
-  <c:clrMapOvr bg1="lt1" tx1="dk1" bg2="lt2" tx2="dk2" accent1="accent1" accent2="accent2" accent3="accent3" accent4="accent4" accent5="accent5" accent6="accent6" hlink="hlink" folHlink="folHlink"/>
   <c:chart>
     <c:autoTitleDeleted val="0"/>
     <c:plotArea>
@@ -1019,8 +1021,8 @@
           <c:showBubbleSize val="0"/>
         </c:dLbls>
         <c:gapWidth val="219"/>
-        <c:axId val="2137895000"/>
-        <c:axId val="2137898744"/>
+        <c:axId val="2129300872"/>
+        <c:axId val="2129304664"/>
       </c:barChart>
       <c:lineChart>
         <c:grouping val="standard"/>
@@ -1169,11 +1171,11 @@
         </c:dLbls>
         <c:marker val="1"/>
         <c:smooth val="0"/>
-        <c:axId val="2137895000"/>
-        <c:axId val="2137898744"/>
+        <c:axId val="2129300872"/>
+        <c:axId val="2129304664"/>
       </c:lineChart>
       <c:catAx>
-        <c:axId val="2137895000"/>
+        <c:axId val="2129300872"/>
         <c:scaling>
           <c:orientation val="minMax"/>
         </c:scaling>
@@ -1216,7 +1218,7 @@
             <a:endParaRPr lang="en-US"/>
           </a:p>
         </c:txPr>
-        <c:crossAx val="2137898744"/>
+        <c:crossAx val="2129304664"/>
         <c:crosses val="autoZero"/>
         <c:auto val="1"/>
         <c:lblAlgn val="ctr"/>
@@ -1224,7 +1226,7 @@
         <c:noMultiLvlLbl val="0"/>
       </c:catAx>
       <c:valAx>
-        <c:axId val="2137898744"/>
+        <c:axId val="2129304664"/>
         <c:scaling>
           <c:orientation val="minMax"/>
           <c:min val="1.285"/>
@@ -1276,7 +1278,7 @@
             <a:endParaRPr lang="en-US"/>
           </a:p>
         </c:txPr>
-        <c:crossAx val="2137895000"/>
+        <c:crossAx val="2129300872"/>
         <c:crosses val="autoZero"/>
         <c:crossBetween val="between"/>
       </c:valAx>
@@ -1317,7 +1319,7 @@
       <a:endParaRPr lang="en-US"/>
     </a:p>
   </c:txPr>
-  <c:externalData r:id="rId2">
+  <c:externalData r:id="rId1">
     <c:autoUpdate val="0"/>
   </c:externalData>
 </c:chartSpace>
@@ -4514,7 +4516,7 @@
           <a:p>
             <a:fld id="{BE47692B-8293-4742-9A6F-5CB15477C2C9}" type="datetimeFigureOut">
               <a:rPr lang="en-US" smtClean="0"/>
-              <a:t>3/21/17</a:t>
+              <a:t>3/23/17</a:t>
             </a:fld>
             <a:endParaRPr lang="en-US"/>
           </a:p>
@@ -5875,7 +5877,7 @@
           <a:p>
             <a:fld id="{E2600852-9DC4-4D3C-9BDB-DBEA638A27CA}" type="datetimeFigureOut">
               <a:rPr lang="en-US" smtClean="0"/>
-              <a:t>3/21/17</a:t>
+              <a:t>3/23/17</a:t>
             </a:fld>
             <a:endParaRPr lang="en-US"/>
           </a:p>
@@ -6045,7 +6047,7 @@
           <a:p>
             <a:fld id="{E2600852-9DC4-4D3C-9BDB-DBEA638A27CA}" type="datetimeFigureOut">
               <a:rPr lang="en-US" smtClean="0"/>
-              <a:t>3/21/17</a:t>
+              <a:t>3/23/17</a:t>
             </a:fld>
             <a:endParaRPr lang="en-US"/>
           </a:p>
@@ -6225,7 +6227,7 @@
           <a:p>
             <a:fld id="{E2600852-9DC4-4D3C-9BDB-DBEA638A27CA}" type="datetimeFigureOut">
               <a:rPr lang="en-US" smtClean="0"/>
-              <a:t>3/21/17</a:t>
+              <a:t>3/23/17</a:t>
             </a:fld>
             <a:endParaRPr lang="en-US"/>
           </a:p>
@@ -6395,7 +6397,7 @@
           <a:p>
             <a:fld id="{E2600852-9DC4-4D3C-9BDB-DBEA638A27CA}" type="datetimeFigureOut">
               <a:rPr lang="en-US" smtClean="0"/>
-              <a:t>3/21/17</a:t>
+              <a:t>3/23/17</a:t>
             </a:fld>
             <a:endParaRPr lang="en-US"/>
           </a:p>
@@ -6641,7 +6643,7 @@
           <a:p>
             <a:fld id="{E2600852-9DC4-4D3C-9BDB-DBEA638A27CA}" type="datetimeFigureOut">
               <a:rPr lang="en-US" smtClean="0"/>
-              <a:t>3/21/17</a:t>
+              <a:t>3/23/17</a:t>
             </a:fld>
             <a:endParaRPr lang="en-US"/>
           </a:p>
@@ -6873,7 +6875,7 @@
           <a:p>
             <a:fld id="{E2600852-9DC4-4D3C-9BDB-DBEA638A27CA}" type="datetimeFigureOut">
               <a:rPr lang="en-US" smtClean="0"/>
-              <a:t>3/21/17</a:t>
+              <a:t>3/23/17</a:t>
             </a:fld>
             <a:endParaRPr lang="en-US"/>
           </a:p>
@@ -7240,7 +7242,7 @@
           <a:p>
             <a:fld id="{E2600852-9DC4-4D3C-9BDB-DBEA638A27CA}" type="datetimeFigureOut">
               <a:rPr lang="en-US" smtClean="0"/>
-              <a:t>3/21/17</a:t>
+              <a:t>3/23/17</a:t>
             </a:fld>
             <a:endParaRPr lang="en-US"/>
           </a:p>
@@ -7358,7 +7360,7 @@
           <a:p>
             <a:fld id="{E2600852-9DC4-4D3C-9BDB-DBEA638A27CA}" type="datetimeFigureOut">
               <a:rPr lang="en-US" smtClean="0"/>
-              <a:t>3/21/17</a:t>
+              <a:t>3/23/17</a:t>
             </a:fld>
             <a:endParaRPr lang="en-US"/>
           </a:p>
@@ -7453,7 +7455,7 @@
           <a:p>
             <a:fld id="{E2600852-9DC4-4D3C-9BDB-DBEA638A27CA}" type="datetimeFigureOut">
               <a:rPr lang="en-US" smtClean="0"/>
-              <a:t>3/21/17</a:t>
+              <a:t>3/23/17</a:t>
             </a:fld>
             <a:endParaRPr lang="en-US"/>
           </a:p>
@@ -7730,7 +7732,7 @@
           <a:p>
             <a:fld id="{E2600852-9DC4-4D3C-9BDB-DBEA638A27CA}" type="datetimeFigureOut">
               <a:rPr lang="en-US" smtClean="0"/>
-              <a:t>3/21/17</a:t>
+              <a:t>3/23/17</a:t>
             </a:fld>
             <a:endParaRPr lang="en-US"/>
           </a:p>
@@ -7983,7 +7985,7 @@
           <a:p>
             <a:fld id="{E2600852-9DC4-4D3C-9BDB-DBEA638A27CA}" type="datetimeFigureOut">
               <a:rPr lang="en-US" smtClean="0"/>
-              <a:t>3/21/17</a:t>
+              <a:t>3/23/17</a:t>
             </a:fld>
             <a:endParaRPr lang="en-US"/>
           </a:p>
@@ -8196,7 +8198,7 @@
           <a:p>
             <a:fld id="{E2600852-9DC4-4D3C-9BDB-DBEA638A27CA}" type="datetimeFigureOut">
               <a:rPr lang="en-US" smtClean="0"/>
-              <a:t>3/21/17</a:t>
+              <a:t>3/23/17</a:t>
             </a:fld>
             <a:endParaRPr lang="en-US"/>
           </a:p>
@@ -9017,13 +9019,13 @@
             <p:ph idx="1"/>
             <p:extLst>
               <p:ext uri="{D42A27DB-BD31-4B8C-83A1-F6EECF244321}">
-                <p14:modId xmlns:p14="http://schemas.microsoft.com/office/powerpoint/2010/main" val="2128201056"/>
+                <p14:modId xmlns:p14="http://schemas.microsoft.com/office/powerpoint/2010/main" val="3930982813"/>
               </p:ext>
             </p:extLst>
           </p:nvPr>
         </p:nvGraphicFramePr>
         <p:xfrm>
-          <a:off x="2785533" y="1583268"/>
+          <a:off x="696789" y="1583268"/>
           <a:ext cx="6620933" cy="4360333"/>
         </p:xfrm>
         <a:graphic>
@@ -9032,6 +9034,114 @@
           </a:graphicData>
         </a:graphic>
       </p:graphicFrame>
+      <p:pic>
+        <p:nvPicPr>
+          <p:cNvPr id="5" name="Picture 3"/>
+          <p:cNvPicPr>
+            <a:picLocks noChangeAspect="1" noChangeArrowheads="1"/>
+          </p:cNvPicPr>
+          <p:nvPr/>
+        </p:nvPicPr>
+        <p:blipFill>
+          <a:blip r:embed="rId8" cstate="print">
+            <a:extLst>
+              <a:ext uri="{28A0092B-C50C-407E-A947-70E740481C1C}">
+                <a14:useLocalDpi xmlns:a14="http://schemas.microsoft.com/office/drawing/2010/main" val="0"/>
+              </a:ext>
+            </a:extLst>
+          </a:blip>
+          <a:srcRect l="33333" t="18221" r="16667" b="16702"/>
+          <a:stretch>
+            <a:fillRect/>
+          </a:stretch>
+        </p:blipFill>
+        <p:spPr bwMode="auto">
+          <a:xfrm>
+            <a:off x="9393053" y="1174026"/>
+            <a:ext cx="1602097" cy="1668851"/>
+          </a:xfrm>
+          <a:prstGeom prst="rect">
+            <a:avLst/>
+          </a:prstGeom>
+          <a:noFill/>
+          <a:ln w="9525">
+            <a:solidFill>
+              <a:schemeClr val="tx1"/>
+            </a:solidFill>
+            <a:miter lim="800000"/>
+            <a:headEnd/>
+            <a:tailEnd/>
+          </a:ln>
+          <a:extLst>
+            <a:ext uri="{909E8E84-426E-40dd-AFC4-6F175D3DCCD1}">
+              <a14:hiddenFill xmlns:a14="http://schemas.microsoft.com/office/drawing/2010/main">
+                <a:solidFill>
+                  <a:srgbClr val="FFFFFF"/>
+                </a:solidFill>
+              </a14:hiddenFill>
+            </a:ext>
+          </a:extLst>
+        </p:spPr>
+      </p:pic>
+      <p:pic>
+        <p:nvPicPr>
+          <p:cNvPr id="3" name="Picture 2" descr="Screen Shot 2017-03-23 at 1.51.16 PM.png"/>
+          <p:cNvPicPr>
+            <a:picLocks noChangeAspect="1"/>
+          </p:cNvPicPr>
+          <p:nvPr/>
+        </p:nvPicPr>
+        <p:blipFill rotWithShape="1">
+          <a:blip r:embed="rId9">
+            <a:extLst>
+              <a:ext uri="{28A0092B-C50C-407E-A947-70E740481C1C}">
+                <a14:useLocalDpi xmlns:a14="http://schemas.microsoft.com/office/drawing/2010/main" val="0"/>
+              </a:ext>
+            </a:extLst>
+          </a:blip>
+          <a:srcRect b="29663"/>
+          <a:stretch/>
+        </p:blipFill>
+        <p:spPr>
+          <a:xfrm>
+            <a:off x="8932598" y="3239779"/>
+            <a:ext cx="2513719" cy="1418647"/>
+          </a:xfrm>
+          <a:prstGeom prst="rect">
+            <a:avLst/>
+          </a:prstGeom>
+        </p:spPr>
+      </p:pic>
+      <p:pic>
+        <p:nvPicPr>
+          <p:cNvPr id="6" name="Picture 5" descr="Screen Shot 2017-03-23 at 1.53.20 PM.png"/>
+          <p:cNvPicPr>
+            <a:picLocks noChangeAspect="1"/>
+          </p:cNvPicPr>
+          <p:nvPr/>
+        </p:nvPicPr>
+        <p:blipFill>
+          <a:blip r:embed="rId10">
+            <a:extLst>
+              <a:ext uri="{28A0092B-C50C-407E-A947-70E740481C1C}">
+                <a14:useLocalDpi xmlns:a14="http://schemas.microsoft.com/office/drawing/2010/main" val="0"/>
+              </a:ext>
+            </a:extLst>
+          </a:blip>
+          <a:stretch>
+            <a:fillRect/>
+          </a:stretch>
+        </p:blipFill>
+        <p:spPr>
+          <a:xfrm>
+            <a:off x="8154457" y="4870962"/>
+            <a:ext cx="3903863" cy="1987038"/>
+          </a:xfrm>
+          <a:prstGeom prst="rect">
+            <a:avLst/>
+          </a:prstGeom>
+        </p:spPr>
+      </p:pic>
     </p:spTree>
     <p:extLst>
       <p:ext uri="{BB962C8B-B14F-4D97-AF65-F5344CB8AC3E}">
@@ -11044,7 +11154,7 @@
           <a:graphicData uri="http://schemas.openxmlformats.org/presentationml/2006/ole">
             <mc:AlternateContent xmlns:mc="http://schemas.openxmlformats.org/markup-compatibility/2006">
               <mc:Choice xmlns:v="urn:schemas-microsoft-com:vml" Requires="v">
-                <p:oleObj spid="_x0000_s2073" name="Equation" r:id="rId5" imgW="2870200" imgH="711200" progId="Equation.3">
+                <p:oleObj spid="_x0000_s2098" name="Equation" r:id="rId5" imgW="2870200" imgH="711200" progId="Equation.3">
                   <p:embed/>
                 </p:oleObj>
               </mc:Choice>
@@ -11817,7 +11927,7 @@
           <a:graphicData uri="http://schemas.openxmlformats.org/presentationml/2006/ole">
             <mc:AlternateContent xmlns:mc="http://schemas.openxmlformats.org/markup-compatibility/2006">
               <mc:Choice xmlns:v="urn:schemas-microsoft-com:vml" Requires="v">
-                <p:oleObj spid="_x0000_s1083" name="Equation" r:id="rId4" imgW="2870200" imgH="711200" progId="Equation.3">
+                <p:oleObj spid="_x0000_s1108" name="Equation" r:id="rId4" imgW="2870200" imgH="711200" progId="Equation.3">
                   <p:embed/>
                 </p:oleObj>
               </mc:Choice>
@@ -12760,7 +12870,7 @@
           <a:graphicData uri="http://schemas.openxmlformats.org/presentationml/2006/ole">
             <mc:AlternateContent xmlns:mc="http://schemas.openxmlformats.org/markup-compatibility/2006">
               <mc:Choice xmlns:v="urn:schemas-microsoft-com:vml" Requires="v">
-                <p:oleObj spid="_x0000_s3077" name="Equation" r:id="rId4" imgW="2108200" imgH="444500" progId="Equation.3">
+                <p:oleObj spid="_x0000_s3102" name="Equation" r:id="rId4" imgW="2108200" imgH="444500" progId="Equation.3">
                   <p:embed/>
                 </p:oleObj>
               </mc:Choice>
@@ -14058,7 +14168,7 @@
           <p:nvPr>
             <p:extLst>
               <p:ext uri="{D42A27DB-BD31-4B8C-83A1-F6EECF244321}">
-                <p14:modId xmlns:p14="http://schemas.microsoft.com/office/powerpoint/2010/main" val="4201769657"/>
+                <p14:modId xmlns:p14="http://schemas.microsoft.com/office/powerpoint/2010/main" val="4164549768"/>
               </p:ext>
             </p:extLst>
           </p:nvPr>
@@ -14112,7 +14222,7 @@
     </p:spTree>
     <p:extLst>
       <p:ext uri="{BB962C8B-B14F-4D97-AF65-F5344CB8AC3E}">
-        <p14:creationId xmlns:p14="http://schemas.microsoft.com/office/powerpoint/2010/main" val="1867567974"/>
+        <p14:creationId xmlns:p14="http://schemas.microsoft.com/office/powerpoint/2010/main" val="1594781864"/>
       </p:ext>
     </p:extLst>
   </p:cSld>
@@ -14207,7 +14317,7 @@
           <p:nvPr>
             <p:extLst>
               <p:ext uri="{D42A27DB-BD31-4B8C-83A1-F6EECF244321}">
-                <p14:modId xmlns:p14="http://schemas.microsoft.com/office/powerpoint/2010/main" val="4164549768"/>
+                <p14:modId xmlns:p14="http://schemas.microsoft.com/office/powerpoint/2010/main" val="4201769657"/>
               </p:ext>
             </p:extLst>
           </p:nvPr>
@@ -14258,10 +14368,266 @@
           </a:p>
         </p:txBody>
       </p:sp>
+      <p:cxnSp>
+        <p:nvCxnSpPr>
+          <p:cNvPr id="6" name="Straight Arrow Connector 5"/>
+          <p:cNvCxnSpPr/>
+          <p:nvPr/>
+        </p:nvCxnSpPr>
+        <p:spPr>
+          <a:xfrm>
+            <a:off x="2590043" y="2356328"/>
+            <a:ext cx="0" cy="768731"/>
+          </a:xfrm>
+          <a:prstGeom prst="straightConnector1">
+            <a:avLst/>
+          </a:prstGeom>
+          <a:ln w="38100" cmpd="sng">
+            <a:solidFill>
+              <a:schemeClr val="tx1"/>
+            </a:solidFill>
+            <a:tailEnd type="arrow"/>
+          </a:ln>
+          <a:scene3d>
+            <a:camera prst="perspectiveFront"/>
+            <a:lightRig rig="threePt" dir="t"/>
+          </a:scene3d>
+        </p:spPr>
+        <p:style>
+          <a:lnRef idx="2">
+            <a:schemeClr val="accent1"/>
+          </a:lnRef>
+          <a:fillRef idx="0">
+            <a:schemeClr val="accent1"/>
+          </a:fillRef>
+          <a:effectRef idx="1">
+            <a:schemeClr val="accent1"/>
+          </a:effectRef>
+          <a:fontRef idx="minor">
+            <a:schemeClr val="tx1"/>
+          </a:fontRef>
+        </p:style>
+      </p:cxnSp>
+      <p:cxnSp>
+        <p:nvCxnSpPr>
+          <p:cNvPr id="14" name="Straight Arrow Connector 13"/>
+          <p:cNvCxnSpPr/>
+          <p:nvPr/>
+        </p:nvCxnSpPr>
+        <p:spPr>
+          <a:xfrm flipH="1">
+            <a:off x="4277748" y="1069539"/>
+            <a:ext cx="16710" cy="417788"/>
+          </a:xfrm>
+          <a:prstGeom prst="straightConnector1">
+            <a:avLst/>
+          </a:prstGeom>
+          <a:ln w="38100" cmpd="sng">
+            <a:solidFill>
+              <a:srgbClr val="660066"/>
+            </a:solidFill>
+            <a:tailEnd type="arrow"/>
+          </a:ln>
+        </p:spPr>
+        <p:style>
+          <a:lnRef idx="2">
+            <a:schemeClr val="accent1"/>
+          </a:lnRef>
+          <a:fillRef idx="0">
+            <a:schemeClr val="accent1"/>
+          </a:fillRef>
+          <a:effectRef idx="1">
+            <a:schemeClr val="accent1"/>
+          </a:effectRef>
+          <a:fontRef idx="minor">
+            <a:schemeClr val="tx1"/>
+          </a:fontRef>
+        </p:style>
+      </p:cxnSp>
+      <p:cxnSp>
+        <p:nvCxnSpPr>
+          <p:cNvPr id="15" name="Straight Arrow Connector 14"/>
+          <p:cNvCxnSpPr/>
+          <p:nvPr/>
+        </p:nvCxnSpPr>
+        <p:spPr>
+          <a:xfrm flipH="1">
+            <a:off x="6552312" y="3110344"/>
+            <a:ext cx="16710" cy="417788"/>
+          </a:xfrm>
+          <a:prstGeom prst="straightConnector1">
+            <a:avLst/>
+          </a:prstGeom>
+          <a:ln w="38100" cmpd="sng">
+            <a:solidFill>
+              <a:srgbClr val="008000"/>
+            </a:solidFill>
+            <a:tailEnd type="arrow"/>
+          </a:ln>
+        </p:spPr>
+        <p:style>
+          <a:lnRef idx="2">
+            <a:schemeClr val="accent1"/>
+          </a:lnRef>
+          <a:fillRef idx="0">
+            <a:schemeClr val="accent1"/>
+          </a:fillRef>
+          <a:effectRef idx="1">
+            <a:schemeClr val="accent1"/>
+          </a:effectRef>
+          <a:fontRef idx="minor">
+            <a:schemeClr val="tx1"/>
+          </a:fontRef>
+        </p:style>
+      </p:cxnSp>
+      <p:cxnSp>
+        <p:nvCxnSpPr>
+          <p:cNvPr id="16" name="Straight Arrow Connector 15"/>
+          <p:cNvCxnSpPr/>
+          <p:nvPr/>
+        </p:nvCxnSpPr>
+        <p:spPr>
+          <a:xfrm flipH="1">
+            <a:off x="6853091" y="2959939"/>
+            <a:ext cx="16710" cy="417788"/>
+          </a:xfrm>
+          <a:prstGeom prst="straightConnector1">
+            <a:avLst/>
+          </a:prstGeom>
+          <a:ln w="38100" cmpd="sng">
+            <a:solidFill>
+              <a:srgbClr val="008000"/>
+            </a:solidFill>
+            <a:tailEnd type="arrow"/>
+          </a:ln>
+        </p:spPr>
+        <p:style>
+          <a:lnRef idx="2">
+            <a:schemeClr val="accent1"/>
+          </a:lnRef>
+          <a:fillRef idx="0">
+            <a:schemeClr val="accent1"/>
+          </a:fillRef>
+          <a:effectRef idx="1">
+            <a:schemeClr val="accent1"/>
+          </a:effectRef>
+          <a:fontRef idx="minor">
+            <a:schemeClr val="tx1"/>
+          </a:fontRef>
+        </p:style>
+      </p:cxnSp>
+      <p:cxnSp>
+        <p:nvCxnSpPr>
+          <p:cNvPr id="17" name="Straight Arrow Connector 16"/>
+          <p:cNvCxnSpPr/>
+          <p:nvPr/>
+        </p:nvCxnSpPr>
+        <p:spPr>
+          <a:xfrm flipH="1">
+            <a:off x="5716814" y="1272073"/>
+            <a:ext cx="16710" cy="417788"/>
+          </a:xfrm>
+          <a:prstGeom prst="straightConnector1">
+            <a:avLst/>
+          </a:prstGeom>
+          <a:ln w="38100" cmpd="sng">
+            <a:solidFill>
+              <a:srgbClr val="660066"/>
+            </a:solidFill>
+            <a:tailEnd type="arrow"/>
+          </a:ln>
+        </p:spPr>
+        <p:style>
+          <a:lnRef idx="2">
+            <a:schemeClr val="accent1"/>
+          </a:lnRef>
+          <a:fillRef idx="0">
+            <a:schemeClr val="accent1"/>
+          </a:fillRef>
+          <a:effectRef idx="1">
+            <a:schemeClr val="accent1"/>
+          </a:effectRef>
+          <a:fontRef idx="minor">
+            <a:schemeClr val="tx1"/>
+          </a:fontRef>
+        </p:style>
+      </p:cxnSp>
+      <p:cxnSp>
+        <p:nvCxnSpPr>
+          <p:cNvPr id="18" name="Straight Arrow Connector 17"/>
+          <p:cNvCxnSpPr/>
+          <p:nvPr/>
+        </p:nvCxnSpPr>
+        <p:spPr>
+          <a:xfrm flipH="1">
+            <a:off x="11114129" y="1389055"/>
+            <a:ext cx="16710" cy="417788"/>
+          </a:xfrm>
+          <a:prstGeom prst="straightConnector1">
+            <a:avLst/>
+          </a:prstGeom>
+          <a:ln w="38100" cmpd="sng">
+            <a:solidFill>
+              <a:srgbClr val="660066"/>
+            </a:solidFill>
+            <a:tailEnd type="arrow"/>
+          </a:ln>
+        </p:spPr>
+        <p:style>
+          <a:lnRef idx="2">
+            <a:schemeClr val="accent1"/>
+          </a:lnRef>
+          <a:fillRef idx="0">
+            <a:schemeClr val="accent1"/>
+          </a:fillRef>
+          <a:effectRef idx="1">
+            <a:schemeClr val="accent1"/>
+          </a:effectRef>
+          <a:fontRef idx="minor">
+            <a:schemeClr val="tx1"/>
+          </a:fontRef>
+        </p:style>
+      </p:cxnSp>
+      <p:cxnSp>
+        <p:nvCxnSpPr>
+          <p:cNvPr id="19" name="Straight Arrow Connector 18"/>
+          <p:cNvCxnSpPr/>
+          <p:nvPr/>
+        </p:nvCxnSpPr>
+        <p:spPr>
+          <a:xfrm flipH="1">
+            <a:off x="9110945" y="3496704"/>
+            <a:ext cx="16710" cy="417788"/>
+          </a:xfrm>
+          <a:prstGeom prst="straightConnector1">
+            <a:avLst/>
+          </a:prstGeom>
+          <a:ln w="38100" cmpd="sng">
+            <a:solidFill>
+              <a:srgbClr val="008000"/>
+            </a:solidFill>
+            <a:tailEnd type="arrow"/>
+          </a:ln>
+        </p:spPr>
+        <p:style>
+          <a:lnRef idx="2">
+            <a:schemeClr val="accent1"/>
+          </a:lnRef>
+          <a:fillRef idx="0">
+            <a:schemeClr val="accent1"/>
+          </a:fillRef>
+          <a:effectRef idx="1">
+            <a:schemeClr val="accent1"/>
+          </a:effectRef>
+          <a:fontRef idx="minor">
+            <a:schemeClr val="tx1"/>
+          </a:fontRef>
+        </p:style>
+      </p:cxnSp>
     </p:spTree>
     <p:extLst>
       <p:ext uri="{BB962C8B-B14F-4D97-AF65-F5344CB8AC3E}">
-        <p14:creationId xmlns:p14="http://schemas.microsoft.com/office/powerpoint/2010/main" val="1594781864"/>
+        <p14:creationId xmlns:p14="http://schemas.microsoft.com/office/powerpoint/2010/main" val="1867567974"/>
       </p:ext>
     </p:extLst>
   </p:cSld>
@@ -14562,7 +14928,7 @@
             <a:r>
               <a:rPr lang="en-US" b="1" dirty="0" smtClean="0">
                 <a:solidFill>
-                  <a:srgbClr val="3366FF"/>
+                  <a:srgbClr val="660066"/>
                 </a:solidFill>
                 <a:latin typeface="Arial" panose="020B0604020202020204" pitchFamily="34" charset="0"/>
                 <a:cs typeface="Arial" panose="020B0604020202020204" pitchFamily="34" charset="0"/>
@@ -14597,7 +14963,7 @@
             <a:r>
               <a:rPr lang="en-US" b="1" dirty="0" smtClean="0">
                 <a:solidFill>
-                  <a:srgbClr val="3366FF"/>
+                  <a:srgbClr val="660066"/>
                 </a:solidFill>
                 <a:latin typeface="Arial" panose="020B0604020202020204" pitchFamily="34" charset="0"/>
                 <a:cs typeface="Arial" panose="020B0604020202020204" pitchFamily="34" charset="0"/>
@@ -14632,7 +14998,7 @@
             <a:r>
               <a:rPr lang="en-US" b="1" dirty="0" smtClean="0">
                 <a:solidFill>
-                  <a:srgbClr val="FF0000"/>
+                  <a:srgbClr val="008000"/>
                 </a:solidFill>
                 <a:latin typeface="Arial" panose="020B0604020202020204" pitchFamily="34" charset="0"/>
                 <a:cs typeface="Arial" panose="020B0604020202020204" pitchFamily="34" charset="0"/>
@@ -14667,7 +15033,7 @@
             <a:r>
               <a:rPr lang="en-US" b="1" dirty="0" smtClean="0">
                 <a:solidFill>
-                  <a:srgbClr val="FF0000"/>
+                  <a:srgbClr val="008000"/>
                 </a:solidFill>
                 <a:latin typeface="Arial" panose="020B0604020202020204" pitchFamily="34" charset="0"/>
                 <a:cs typeface="Arial" panose="020B0604020202020204" pitchFamily="34" charset="0"/>
@@ -14702,7 +15068,7 @@
             <a:r>
               <a:rPr lang="en-US" b="1" dirty="0" smtClean="0">
                 <a:solidFill>
-                  <a:srgbClr val="FF0000"/>
+                  <a:srgbClr val="008000"/>
                 </a:solidFill>
                 <a:latin typeface="Arial" panose="020B0604020202020204" pitchFamily="34" charset="0"/>
                 <a:cs typeface="Arial" panose="020B0604020202020204" pitchFamily="34" charset="0"/>
@@ -14737,7 +15103,7 @@
             <a:r>
               <a:rPr lang="en-US" b="1" dirty="0" smtClean="0">
                 <a:solidFill>
-                  <a:srgbClr val="3366FF"/>
+                  <a:srgbClr val="660066"/>
                 </a:solidFill>
                 <a:latin typeface="Arial" panose="020B0604020202020204" pitchFamily="34" charset="0"/>
                 <a:cs typeface="Arial" panose="020B0604020202020204" pitchFamily="34" charset="0"/>
@@ -15173,7 +15539,31 @@
                 <a:latin typeface="Arial" panose="020B0604020202020204" pitchFamily="34" charset="0"/>
                 <a:cs typeface="Arial" panose="020B0604020202020204" pitchFamily="34" charset="0"/>
               </a:rPr>
-              <a:t>Random Networks with Edges Similar to DB5 Network Performed Better than networks that were not Similar</a:t>
+              <a:t>Random Networks with Edges Similar to DB5 Network Performed Better than </a:t>
+            </a:r>
+            <a:r>
+              <a:rPr lang="en-US" sz="2800" b="1" dirty="0" smtClean="0">
+                <a:solidFill>
+                  <a:schemeClr val="accent1">
+                    <a:lumMod val="75000"/>
+                  </a:schemeClr>
+                </a:solidFill>
+                <a:latin typeface="Arial" panose="020B0604020202020204" pitchFamily="34" charset="0"/>
+                <a:cs typeface="Arial" panose="020B0604020202020204" pitchFamily="34" charset="0"/>
+              </a:rPr>
+              <a:t>Networks </a:t>
+            </a:r>
+            <a:r>
+              <a:rPr lang="en-US" sz="2800" b="1" dirty="0" smtClean="0">
+                <a:solidFill>
+                  <a:schemeClr val="accent1">
+                    <a:lumMod val="75000"/>
+                  </a:schemeClr>
+                </a:solidFill>
+                <a:latin typeface="Arial" panose="020B0604020202020204" pitchFamily="34" charset="0"/>
+                <a:cs typeface="Arial" panose="020B0604020202020204" pitchFamily="34" charset="0"/>
+              </a:rPr>
+              <a:t>that were not Similar</a:t>
             </a:r>
             <a:endParaRPr lang="en-US" sz="2800" b="1" dirty="0">
               <a:solidFill>
@@ -15208,7 +15598,7 @@
         </p:blipFill>
         <p:spPr>
           <a:xfrm>
-            <a:off x="0" y="2514747"/>
+            <a:off x="0" y="2558541"/>
             <a:ext cx="3923644" cy="2560320"/>
           </a:xfrm>
           <a:prstGeom prst="rect">
@@ -15274,7 +15664,7 @@
         </p:blipFill>
         <p:spPr>
           <a:xfrm>
-            <a:off x="6889110" y="4136196"/>
+            <a:off x="6571621" y="3902231"/>
             <a:ext cx="3925824" cy="2560320"/>
           </a:xfrm>
           <a:prstGeom prst="rect">
@@ -15290,7 +15680,7 @@
         </p:nvSpPr>
         <p:spPr>
           <a:xfrm>
-            <a:off x="4488181" y="6184530"/>
+            <a:off x="7713202" y="6455244"/>
             <a:ext cx="2762645" cy="369332"/>
           </a:xfrm>
           <a:prstGeom prst="rect">
@@ -15305,7 +15695,10 @@
           <a:lstStyle/>
           <a:p>
             <a:r>
-              <a:rPr lang="en-US" dirty="0" smtClean="0">
+              <a:rPr lang="en-US" b="1" dirty="0" smtClean="0">
+                <a:solidFill>
+                  <a:srgbClr val="660066"/>
+                </a:solidFill>
                 <a:latin typeface="Arial" panose="020B0604020202020204" pitchFamily="34" charset="0"/>
                 <a:cs typeface="Arial" panose="020B0604020202020204" pitchFamily="34" charset="0"/>
               </a:rPr>
@@ -15336,7 +15729,7 @@
         </p:blipFill>
         <p:spPr>
           <a:xfrm>
-            <a:off x="7002108" y="1294393"/>
+            <a:off x="6684619" y="1027009"/>
             <a:ext cx="3925824" cy="2560320"/>
           </a:xfrm>
           <a:prstGeom prst="rect">
@@ -15352,7 +15745,7 @@
         </p:nvSpPr>
         <p:spPr>
           <a:xfrm>
-            <a:off x="4483994" y="3171030"/>
+            <a:off x="7625465" y="3488546"/>
             <a:ext cx="2762645" cy="369332"/>
           </a:xfrm>
           <a:prstGeom prst="rect">
@@ -15367,12 +15760,2145 @@
           <a:lstStyle/>
           <a:p>
             <a:r>
-              <a:rPr lang="en-US" dirty="0" smtClean="0">
+              <a:rPr lang="en-US" b="1" dirty="0" smtClean="0">
+                <a:solidFill>
+                  <a:srgbClr val="008000"/>
+                </a:solidFill>
                 <a:latin typeface="Arial" panose="020B0604020202020204" pitchFamily="34" charset="0"/>
                 <a:cs typeface="Arial" panose="020B0604020202020204" pitchFamily="34" charset="0"/>
               </a:rPr>
               <a:t>Random Network 16</a:t>
             </a:r>
+          </a:p>
+        </p:txBody>
+      </p:sp>
+      <p:sp>
+        <p:nvSpPr>
+          <p:cNvPr id="3" name="TextBox 2"/>
+          <p:cNvSpPr txBox="1"/>
+          <p:nvPr/>
+        </p:nvSpPr>
+        <p:spPr>
+          <a:xfrm>
+            <a:off x="4620068" y="1324795"/>
+            <a:ext cx="2088520" cy="1815882"/>
+          </a:xfrm>
+          <a:prstGeom prst="rect">
+            <a:avLst/>
+          </a:prstGeom>
+          <a:noFill/>
+        </p:spPr>
+        <p:txBody>
+          <a:bodyPr wrap="square" rtlCol="0">
+            <a:spAutoFit/>
+          </a:bodyPr>
+          <a:lstStyle/>
+          <a:p>
+            <a:r>
+              <a:rPr lang="en-US" sz="1400" dirty="0" smtClean="0"/>
+              <a:t>Nodes shared:</a:t>
+            </a:r>
+          </a:p>
+          <a:p>
+            <a:pPr marL="285750" indent="-285750">
+              <a:buFont typeface="Arial"/>
+              <a:buChar char="•"/>
+            </a:pPr>
+            <a:r>
+              <a:rPr lang="en-US" sz="1400" dirty="0" smtClean="0"/>
+              <a:t>CIN5</a:t>
+            </a:r>
+            <a:r>
+              <a:rPr lang="en-US" sz="1400" dirty="0" smtClean="0">
+                <a:sym typeface="Wingdings"/>
+              </a:rPr>
+              <a:t> SFP1, negligible</a:t>
+            </a:r>
+          </a:p>
+          <a:p>
+            <a:pPr marL="285750" indent="-285750">
+              <a:buFont typeface="Arial"/>
+              <a:buChar char="•"/>
+            </a:pPr>
+            <a:r>
+              <a:rPr lang="en-US" sz="1400" dirty="0" smtClean="0">
+                <a:sym typeface="Wingdings"/>
+              </a:rPr>
+              <a:t>HMO1 YOX1, same regulation type</a:t>
+            </a:r>
+          </a:p>
+          <a:p>
+            <a:pPr marL="285750" indent="-285750">
+              <a:buFont typeface="Arial"/>
+              <a:buChar char="•"/>
+            </a:pPr>
+            <a:r>
+              <a:rPr lang="en-US" sz="1400" dirty="0" smtClean="0">
+                <a:sym typeface="Wingdings"/>
+              </a:rPr>
+              <a:t>MSN2 CIN5, same regulation type</a:t>
+            </a:r>
+            <a:endParaRPr lang="en-US" sz="1400" dirty="0" smtClean="0"/>
+          </a:p>
+          <a:p>
+            <a:endParaRPr lang="en-US" sz="1400" dirty="0"/>
+          </a:p>
+        </p:txBody>
+      </p:sp>
+      <p:sp>
+        <p:nvSpPr>
+          <p:cNvPr id="13" name="TextBox 12"/>
+          <p:cNvSpPr txBox="1"/>
+          <p:nvPr/>
+        </p:nvSpPr>
+        <p:spPr>
+          <a:xfrm>
+            <a:off x="4579471" y="4718013"/>
+            <a:ext cx="2106705" cy="954107"/>
+          </a:xfrm>
+          <a:prstGeom prst="rect">
+            <a:avLst/>
+          </a:prstGeom>
+          <a:noFill/>
+        </p:spPr>
+        <p:txBody>
+          <a:bodyPr wrap="square" rtlCol="0">
+            <a:spAutoFit/>
+          </a:bodyPr>
+          <a:lstStyle/>
+          <a:p>
+            <a:r>
+              <a:rPr lang="en-US" sz="1400" dirty="0" smtClean="0"/>
+              <a:t>Nodes shared:</a:t>
+            </a:r>
+          </a:p>
+          <a:p>
+            <a:pPr marL="285750" indent="-285750">
+              <a:buFont typeface="Arial"/>
+              <a:buChar char="•"/>
+            </a:pPr>
+            <a:r>
+              <a:rPr lang="en-US" sz="1400" dirty="0" smtClean="0"/>
+              <a:t>MSN2</a:t>
+            </a:r>
+            <a:r>
+              <a:rPr lang="en-US" sz="1400" dirty="0" smtClean="0">
+                <a:sym typeface="Wingdings"/>
+              </a:rPr>
+              <a:t> SFP1, different regulation type</a:t>
+            </a:r>
+            <a:endParaRPr lang="en-US" sz="1400" dirty="0"/>
+          </a:p>
+        </p:txBody>
+      </p:sp>
+      <p:sp>
+        <p:nvSpPr>
+          <p:cNvPr id="7" name="Freeform 6"/>
+          <p:cNvSpPr/>
+          <p:nvPr/>
+        </p:nvSpPr>
+        <p:spPr>
+          <a:xfrm>
+            <a:off x="8276711" y="1313845"/>
+            <a:ext cx="1894009" cy="1521871"/>
+          </a:xfrm>
+          <a:custGeom>
+            <a:avLst/>
+            <a:gdLst>
+              <a:gd name="connsiteX0" fmla="*/ 1817373 w 1817373"/>
+              <a:gd name="connsiteY0" fmla="*/ 0 h 1324794"/>
+              <a:gd name="connsiteX1" fmla="*/ 1718841 w 1817373"/>
+              <a:gd name="connsiteY1" fmla="*/ 10948 h 1324794"/>
+              <a:gd name="connsiteX2" fmla="*/ 1653152 w 1817373"/>
+              <a:gd name="connsiteY2" fmla="*/ 32846 h 1324794"/>
+              <a:gd name="connsiteX3" fmla="*/ 1620308 w 1817373"/>
+              <a:gd name="connsiteY3" fmla="*/ 43794 h 1324794"/>
+              <a:gd name="connsiteX4" fmla="*/ 1565568 w 1817373"/>
+              <a:gd name="connsiteY4" fmla="*/ 54743 h 1324794"/>
+              <a:gd name="connsiteX5" fmla="*/ 1467036 w 1817373"/>
+              <a:gd name="connsiteY5" fmla="*/ 98538 h 1324794"/>
+              <a:gd name="connsiteX6" fmla="*/ 1401348 w 1817373"/>
+              <a:gd name="connsiteY6" fmla="*/ 120435 h 1324794"/>
+              <a:gd name="connsiteX7" fmla="*/ 1335660 w 1817373"/>
+              <a:gd name="connsiteY7" fmla="*/ 153282 h 1324794"/>
+              <a:gd name="connsiteX8" fmla="*/ 1215231 w 1817373"/>
+              <a:gd name="connsiteY8" fmla="*/ 186128 h 1324794"/>
+              <a:gd name="connsiteX9" fmla="*/ 1116699 w 1817373"/>
+              <a:gd name="connsiteY9" fmla="*/ 240871 h 1324794"/>
+              <a:gd name="connsiteX10" fmla="*/ 1105751 w 1817373"/>
+              <a:gd name="connsiteY10" fmla="*/ 273717 h 1324794"/>
+              <a:gd name="connsiteX11" fmla="*/ 1061959 w 1817373"/>
+              <a:gd name="connsiteY11" fmla="*/ 295615 h 1324794"/>
+              <a:gd name="connsiteX12" fmla="*/ 1029115 w 1817373"/>
+              <a:gd name="connsiteY12" fmla="*/ 317512 h 1324794"/>
+              <a:gd name="connsiteX13" fmla="*/ 1007219 w 1817373"/>
+              <a:gd name="connsiteY13" fmla="*/ 339410 h 1324794"/>
+              <a:gd name="connsiteX14" fmla="*/ 941531 w 1817373"/>
+              <a:gd name="connsiteY14" fmla="*/ 361307 h 1324794"/>
+              <a:gd name="connsiteX15" fmla="*/ 908686 w 1817373"/>
+              <a:gd name="connsiteY15" fmla="*/ 372256 h 1324794"/>
+              <a:gd name="connsiteX16" fmla="*/ 842998 w 1817373"/>
+              <a:gd name="connsiteY16" fmla="*/ 416051 h 1324794"/>
+              <a:gd name="connsiteX17" fmla="*/ 777310 w 1817373"/>
+              <a:gd name="connsiteY17" fmla="*/ 437948 h 1324794"/>
+              <a:gd name="connsiteX18" fmla="*/ 711622 w 1817373"/>
+              <a:gd name="connsiteY18" fmla="*/ 470794 h 1324794"/>
+              <a:gd name="connsiteX19" fmla="*/ 689726 w 1817373"/>
+              <a:gd name="connsiteY19" fmla="*/ 492692 h 1324794"/>
+              <a:gd name="connsiteX20" fmla="*/ 656882 w 1817373"/>
+              <a:gd name="connsiteY20" fmla="*/ 514589 h 1324794"/>
+              <a:gd name="connsiteX21" fmla="*/ 613090 w 1817373"/>
+              <a:gd name="connsiteY21" fmla="*/ 558384 h 1324794"/>
+              <a:gd name="connsiteX22" fmla="*/ 558349 w 1817373"/>
+              <a:gd name="connsiteY22" fmla="*/ 613127 h 1324794"/>
+              <a:gd name="connsiteX23" fmla="*/ 514557 w 1817373"/>
+              <a:gd name="connsiteY23" fmla="*/ 678820 h 1324794"/>
+              <a:gd name="connsiteX24" fmla="*/ 492661 w 1817373"/>
+              <a:gd name="connsiteY24" fmla="*/ 711666 h 1324794"/>
+              <a:gd name="connsiteX25" fmla="*/ 459817 w 1817373"/>
+              <a:gd name="connsiteY25" fmla="*/ 733563 h 1324794"/>
+              <a:gd name="connsiteX26" fmla="*/ 437921 w 1817373"/>
+              <a:gd name="connsiteY26" fmla="*/ 755461 h 1324794"/>
+              <a:gd name="connsiteX27" fmla="*/ 394129 w 1817373"/>
+              <a:gd name="connsiteY27" fmla="*/ 766409 h 1324794"/>
+              <a:gd name="connsiteX28" fmla="*/ 372233 w 1817373"/>
+              <a:gd name="connsiteY28" fmla="*/ 788307 h 1324794"/>
+              <a:gd name="connsiteX29" fmla="*/ 350337 w 1817373"/>
+              <a:gd name="connsiteY29" fmla="*/ 821153 h 1324794"/>
+              <a:gd name="connsiteX30" fmla="*/ 317493 w 1817373"/>
+              <a:gd name="connsiteY30" fmla="*/ 843050 h 1324794"/>
+              <a:gd name="connsiteX31" fmla="*/ 273701 w 1817373"/>
+              <a:gd name="connsiteY31" fmla="*/ 908743 h 1324794"/>
+              <a:gd name="connsiteX32" fmla="*/ 240857 w 1817373"/>
+              <a:gd name="connsiteY32" fmla="*/ 974435 h 1324794"/>
+              <a:gd name="connsiteX33" fmla="*/ 153272 w 1817373"/>
+              <a:gd name="connsiteY33" fmla="*/ 1051076 h 1324794"/>
+              <a:gd name="connsiteX34" fmla="*/ 120428 w 1817373"/>
+              <a:gd name="connsiteY34" fmla="*/ 1083922 h 1324794"/>
+              <a:gd name="connsiteX35" fmla="*/ 109480 w 1817373"/>
+              <a:gd name="connsiteY35" fmla="*/ 1116768 h 1324794"/>
+              <a:gd name="connsiteX36" fmla="*/ 43792 w 1817373"/>
+              <a:gd name="connsiteY36" fmla="*/ 1204358 h 1324794"/>
+              <a:gd name="connsiteX37" fmla="*/ 21896 w 1817373"/>
+              <a:gd name="connsiteY37" fmla="*/ 1270050 h 1324794"/>
+              <a:gd name="connsiteX38" fmla="*/ 10948 w 1817373"/>
+              <a:gd name="connsiteY38" fmla="*/ 1302896 h 1324794"/>
+              <a:gd name="connsiteX39" fmla="*/ 0 w 1817373"/>
+              <a:gd name="connsiteY39" fmla="*/ 1324794 h 1324794"/>
+            </a:gdLst>
+            <a:ahLst/>
+            <a:cxnLst>
+              <a:cxn ang="0">
+                <a:pos x="connsiteX0" y="connsiteY0"/>
+              </a:cxn>
+              <a:cxn ang="0">
+                <a:pos x="connsiteX1" y="connsiteY1"/>
+              </a:cxn>
+              <a:cxn ang="0">
+                <a:pos x="connsiteX2" y="connsiteY2"/>
+              </a:cxn>
+              <a:cxn ang="0">
+                <a:pos x="connsiteX3" y="connsiteY3"/>
+              </a:cxn>
+              <a:cxn ang="0">
+                <a:pos x="connsiteX4" y="connsiteY4"/>
+              </a:cxn>
+              <a:cxn ang="0">
+                <a:pos x="connsiteX5" y="connsiteY5"/>
+              </a:cxn>
+              <a:cxn ang="0">
+                <a:pos x="connsiteX6" y="connsiteY6"/>
+              </a:cxn>
+              <a:cxn ang="0">
+                <a:pos x="connsiteX7" y="connsiteY7"/>
+              </a:cxn>
+              <a:cxn ang="0">
+                <a:pos x="connsiteX8" y="connsiteY8"/>
+              </a:cxn>
+              <a:cxn ang="0">
+                <a:pos x="connsiteX9" y="connsiteY9"/>
+              </a:cxn>
+              <a:cxn ang="0">
+                <a:pos x="connsiteX10" y="connsiteY10"/>
+              </a:cxn>
+              <a:cxn ang="0">
+                <a:pos x="connsiteX11" y="connsiteY11"/>
+              </a:cxn>
+              <a:cxn ang="0">
+                <a:pos x="connsiteX12" y="connsiteY12"/>
+              </a:cxn>
+              <a:cxn ang="0">
+                <a:pos x="connsiteX13" y="connsiteY13"/>
+              </a:cxn>
+              <a:cxn ang="0">
+                <a:pos x="connsiteX14" y="connsiteY14"/>
+              </a:cxn>
+              <a:cxn ang="0">
+                <a:pos x="connsiteX15" y="connsiteY15"/>
+              </a:cxn>
+              <a:cxn ang="0">
+                <a:pos x="connsiteX16" y="connsiteY16"/>
+              </a:cxn>
+              <a:cxn ang="0">
+                <a:pos x="connsiteX17" y="connsiteY17"/>
+              </a:cxn>
+              <a:cxn ang="0">
+                <a:pos x="connsiteX18" y="connsiteY18"/>
+              </a:cxn>
+              <a:cxn ang="0">
+                <a:pos x="connsiteX19" y="connsiteY19"/>
+              </a:cxn>
+              <a:cxn ang="0">
+                <a:pos x="connsiteX20" y="connsiteY20"/>
+              </a:cxn>
+              <a:cxn ang="0">
+                <a:pos x="connsiteX21" y="connsiteY21"/>
+              </a:cxn>
+              <a:cxn ang="0">
+                <a:pos x="connsiteX22" y="connsiteY22"/>
+              </a:cxn>
+              <a:cxn ang="0">
+                <a:pos x="connsiteX23" y="connsiteY23"/>
+              </a:cxn>
+              <a:cxn ang="0">
+                <a:pos x="connsiteX24" y="connsiteY24"/>
+              </a:cxn>
+              <a:cxn ang="0">
+                <a:pos x="connsiteX25" y="connsiteY25"/>
+              </a:cxn>
+              <a:cxn ang="0">
+                <a:pos x="connsiteX26" y="connsiteY26"/>
+              </a:cxn>
+              <a:cxn ang="0">
+                <a:pos x="connsiteX27" y="connsiteY27"/>
+              </a:cxn>
+              <a:cxn ang="0">
+                <a:pos x="connsiteX28" y="connsiteY28"/>
+              </a:cxn>
+              <a:cxn ang="0">
+                <a:pos x="connsiteX29" y="connsiteY29"/>
+              </a:cxn>
+              <a:cxn ang="0">
+                <a:pos x="connsiteX30" y="connsiteY30"/>
+              </a:cxn>
+              <a:cxn ang="0">
+                <a:pos x="connsiteX31" y="connsiteY31"/>
+              </a:cxn>
+              <a:cxn ang="0">
+                <a:pos x="connsiteX32" y="connsiteY32"/>
+              </a:cxn>
+              <a:cxn ang="0">
+                <a:pos x="connsiteX33" y="connsiteY33"/>
+              </a:cxn>
+              <a:cxn ang="0">
+                <a:pos x="connsiteX34" y="connsiteY34"/>
+              </a:cxn>
+              <a:cxn ang="0">
+                <a:pos x="connsiteX35" y="connsiteY35"/>
+              </a:cxn>
+              <a:cxn ang="0">
+                <a:pos x="connsiteX36" y="connsiteY36"/>
+              </a:cxn>
+              <a:cxn ang="0">
+                <a:pos x="connsiteX37" y="connsiteY37"/>
+              </a:cxn>
+              <a:cxn ang="0">
+                <a:pos x="connsiteX38" y="connsiteY38"/>
+              </a:cxn>
+              <a:cxn ang="0">
+                <a:pos x="connsiteX39" y="connsiteY39"/>
+              </a:cxn>
+            </a:cxnLst>
+            <a:rect l="l" t="t" r="r" b="b"/>
+            <a:pathLst>
+              <a:path w="1817373" h="1324794">
+                <a:moveTo>
+                  <a:pt x="1817373" y="0"/>
+                </a:moveTo>
+                <a:cubicBezTo>
+                  <a:pt x="1784529" y="3649"/>
+                  <a:pt x="1751245" y="4467"/>
+                  <a:pt x="1718841" y="10948"/>
+                </a:cubicBezTo>
+                <a:cubicBezTo>
+                  <a:pt x="1696208" y="15475"/>
+                  <a:pt x="1675048" y="25547"/>
+                  <a:pt x="1653152" y="32846"/>
+                </a:cubicBezTo>
+                <a:cubicBezTo>
+                  <a:pt x="1642204" y="36495"/>
+                  <a:pt x="1631624" y="41531"/>
+                  <a:pt x="1620308" y="43794"/>
+                </a:cubicBezTo>
+                <a:cubicBezTo>
+                  <a:pt x="1602061" y="47444"/>
+                  <a:pt x="1583520" y="49846"/>
+                  <a:pt x="1565568" y="54743"/>
+                </a:cubicBezTo>
+                <a:cubicBezTo>
+                  <a:pt x="1396832" y="100766"/>
+                  <a:pt x="1570715" y="52457"/>
+                  <a:pt x="1467036" y="98538"/>
+                </a:cubicBezTo>
+                <a:cubicBezTo>
+                  <a:pt x="1445945" y="107912"/>
+                  <a:pt x="1401348" y="120435"/>
+                  <a:pt x="1401348" y="120435"/>
+                </a:cubicBezTo>
+                <a:cubicBezTo>
+                  <a:pt x="1369240" y="141842"/>
+                  <a:pt x="1371920" y="144217"/>
+                  <a:pt x="1335660" y="153282"/>
+                </a:cubicBezTo>
+                <a:cubicBezTo>
+                  <a:pt x="1302752" y="161509"/>
+                  <a:pt x="1243420" y="167334"/>
+                  <a:pt x="1215231" y="186128"/>
+                </a:cubicBezTo>
+                <a:cubicBezTo>
+                  <a:pt x="1139941" y="236325"/>
+                  <a:pt x="1174509" y="221601"/>
+                  <a:pt x="1116699" y="240871"/>
+                </a:cubicBezTo>
+                <a:cubicBezTo>
+                  <a:pt x="1113050" y="251820"/>
+                  <a:pt x="1113911" y="265556"/>
+                  <a:pt x="1105751" y="273717"/>
+                </a:cubicBezTo>
+                <a:cubicBezTo>
+                  <a:pt x="1094211" y="285258"/>
+                  <a:pt x="1076129" y="287517"/>
+                  <a:pt x="1061959" y="295615"/>
+                </a:cubicBezTo>
+                <a:cubicBezTo>
+                  <a:pt x="1050535" y="302144"/>
+                  <a:pt x="1039389" y="309292"/>
+                  <a:pt x="1029115" y="317512"/>
+                </a:cubicBezTo>
+                <a:cubicBezTo>
+                  <a:pt x="1021055" y="323961"/>
+                  <a:pt x="1016451" y="334793"/>
+                  <a:pt x="1007219" y="339410"/>
+                </a:cubicBezTo>
+                <a:cubicBezTo>
+                  <a:pt x="986575" y="349732"/>
+                  <a:pt x="963427" y="354008"/>
+                  <a:pt x="941531" y="361307"/>
+                </a:cubicBezTo>
+                <a:cubicBezTo>
+                  <a:pt x="930583" y="364957"/>
+                  <a:pt x="918288" y="365854"/>
+                  <a:pt x="908686" y="372256"/>
+                </a:cubicBezTo>
+                <a:cubicBezTo>
+                  <a:pt x="886790" y="386854"/>
+                  <a:pt x="867964" y="407729"/>
+                  <a:pt x="842998" y="416051"/>
+                </a:cubicBezTo>
+                <a:cubicBezTo>
+                  <a:pt x="821102" y="423350"/>
+                  <a:pt x="796514" y="425145"/>
+                  <a:pt x="777310" y="437948"/>
+                </a:cubicBezTo>
+                <a:cubicBezTo>
+                  <a:pt x="734864" y="466247"/>
+                  <a:pt x="756949" y="455684"/>
+                  <a:pt x="711622" y="470794"/>
+                </a:cubicBezTo>
+                <a:cubicBezTo>
+                  <a:pt x="704323" y="478093"/>
+                  <a:pt x="697786" y="486243"/>
+                  <a:pt x="689726" y="492692"/>
+                </a:cubicBezTo>
+                <a:cubicBezTo>
+                  <a:pt x="679452" y="500912"/>
+                  <a:pt x="665101" y="504314"/>
+                  <a:pt x="656882" y="514589"/>
+                </a:cubicBezTo>
+                <a:cubicBezTo>
+                  <a:pt x="614417" y="567673"/>
+                  <a:pt x="684749" y="534495"/>
+                  <a:pt x="613090" y="558384"/>
+                </a:cubicBezTo>
+                <a:cubicBezTo>
+                  <a:pt x="594843" y="576632"/>
+                  <a:pt x="572663" y="591655"/>
+                  <a:pt x="558349" y="613127"/>
+                </a:cubicBezTo>
+                <a:lnTo>
+                  <a:pt x="514557" y="678820"/>
+                </a:lnTo>
+                <a:cubicBezTo>
+                  <a:pt x="507258" y="689769"/>
+                  <a:pt x="503609" y="704367"/>
+                  <a:pt x="492661" y="711666"/>
+                </a:cubicBezTo>
+                <a:cubicBezTo>
+                  <a:pt x="481713" y="718965"/>
+                  <a:pt x="470091" y="725343"/>
+                  <a:pt x="459817" y="733563"/>
+                </a:cubicBezTo>
+                <a:cubicBezTo>
+                  <a:pt x="451757" y="740012"/>
+                  <a:pt x="447153" y="750844"/>
+                  <a:pt x="437921" y="755461"/>
+                </a:cubicBezTo>
+                <a:cubicBezTo>
+                  <a:pt x="424463" y="762190"/>
+                  <a:pt x="408726" y="762760"/>
+                  <a:pt x="394129" y="766409"/>
+                </a:cubicBezTo>
+                <a:cubicBezTo>
+                  <a:pt x="386830" y="773708"/>
+                  <a:pt x="378681" y="780246"/>
+                  <a:pt x="372233" y="788307"/>
+                </a:cubicBezTo>
+                <a:cubicBezTo>
+                  <a:pt x="364013" y="798582"/>
+                  <a:pt x="359641" y="811848"/>
+                  <a:pt x="350337" y="821153"/>
+                </a:cubicBezTo>
+                <a:cubicBezTo>
+                  <a:pt x="341033" y="830457"/>
+                  <a:pt x="328441" y="835751"/>
+                  <a:pt x="317493" y="843050"/>
+                </a:cubicBezTo>
+                <a:cubicBezTo>
+                  <a:pt x="302896" y="864948"/>
+                  <a:pt x="282023" y="883776"/>
+                  <a:pt x="273701" y="908743"/>
+                </a:cubicBezTo>
+                <a:cubicBezTo>
+                  <a:pt x="263365" y="939753"/>
+                  <a:pt x="263713" y="948313"/>
+                  <a:pt x="240857" y="974435"/>
+                </a:cubicBezTo>
+                <a:cubicBezTo>
+                  <a:pt x="149010" y="1079409"/>
+                  <a:pt x="221763" y="993997"/>
+                  <a:pt x="153272" y="1051076"/>
+                </a:cubicBezTo>
+                <a:cubicBezTo>
+                  <a:pt x="141378" y="1060988"/>
+                  <a:pt x="131376" y="1072973"/>
+                  <a:pt x="120428" y="1083922"/>
+                </a:cubicBezTo>
+                <a:cubicBezTo>
+                  <a:pt x="116779" y="1094871"/>
+                  <a:pt x="115417" y="1106872"/>
+                  <a:pt x="109480" y="1116768"/>
+                </a:cubicBezTo>
+                <a:cubicBezTo>
+                  <a:pt x="70575" y="1181615"/>
+                  <a:pt x="89234" y="1068024"/>
+                  <a:pt x="43792" y="1204358"/>
+                </a:cubicBezTo>
+                <a:lnTo>
+                  <a:pt x="21896" y="1270050"/>
+                </a:lnTo>
+                <a:cubicBezTo>
+                  <a:pt x="18247" y="1280999"/>
+                  <a:pt x="16109" y="1292573"/>
+                  <a:pt x="10948" y="1302896"/>
+                </a:cubicBezTo>
+                <a:lnTo>
+                  <a:pt x="0" y="1324794"/>
+                </a:lnTo>
+              </a:path>
+            </a:pathLst>
+          </a:custGeom>
+          <a:noFill/>
+          <a:ln w="38100" cmpd="sng">
+            <a:solidFill>
+              <a:schemeClr val="accent4">
+                <a:alpha val="50000"/>
+              </a:schemeClr>
+            </a:solidFill>
+          </a:ln>
+        </p:spPr>
+        <p:style>
+          <a:lnRef idx="2">
+            <a:schemeClr val="accent1"/>
+          </a:lnRef>
+          <a:fillRef idx="0">
+            <a:schemeClr val="accent1"/>
+          </a:fillRef>
+          <a:effectRef idx="1">
+            <a:schemeClr val="accent1"/>
+          </a:effectRef>
+          <a:fontRef idx="minor">
+            <a:schemeClr val="tx1"/>
+          </a:fontRef>
+        </p:style>
+        <p:txBody>
+          <a:bodyPr rtlCol="0" anchor="ctr"/>
+          <a:lstStyle/>
+          <a:p>
+            <a:pPr algn="ctr"/>
+            <a:endParaRPr lang="en-US"/>
+          </a:p>
+        </p:txBody>
+      </p:sp>
+      <p:sp>
+        <p:nvSpPr>
+          <p:cNvPr id="16" name="Freeform 15"/>
+          <p:cNvSpPr/>
+          <p:nvPr/>
+        </p:nvSpPr>
+        <p:spPr>
+          <a:xfrm>
+            <a:off x="7085263" y="2361754"/>
+            <a:ext cx="1149684" cy="917965"/>
+          </a:xfrm>
+          <a:custGeom>
+            <a:avLst/>
+            <a:gdLst>
+              <a:gd name="connsiteX0" fmla="*/ 0 w 1149684"/>
+              <a:gd name="connsiteY0" fmla="*/ 0 h 917965"/>
+              <a:gd name="connsiteX1" fmla="*/ 22281 w 1149684"/>
+              <a:gd name="connsiteY1" fmla="*/ 8913 h 917965"/>
+              <a:gd name="connsiteX2" fmla="*/ 49018 w 1149684"/>
+              <a:gd name="connsiteY2" fmla="*/ 22281 h 917965"/>
+              <a:gd name="connsiteX3" fmla="*/ 62386 w 1149684"/>
+              <a:gd name="connsiteY3" fmla="*/ 31193 h 917965"/>
+              <a:gd name="connsiteX4" fmla="*/ 93579 w 1149684"/>
+              <a:gd name="connsiteY4" fmla="*/ 40106 h 917965"/>
+              <a:gd name="connsiteX5" fmla="*/ 120316 w 1149684"/>
+              <a:gd name="connsiteY5" fmla="*/ 49018 h 917965"/>
+              <a:gd name="connsiteX6" fmla="*/ 160421 w 1149684"/>
+              <a:gd name="connsiteY6" fmla="*/ 62386 h 917965"/>
+              <a:gd name="connsiteX7" fmla="*/ 173790 w 1149684"/>
+              <a:gd name="connsiteY7" fmla="*/ 66842 h 917965"/>
+              <a:gd name="connsiteX8" fmla="*/ 240632 w 1149684"/>
+              <a:gd name="connsiteY8" fmla="*/ 80211 h 917965"/>
+              <a:gd name="connsiteX9" fmla="*/ 254000 w 1149684"/>
+              <a:gd name="connsiteY9" fmla="*/ 84667 h 917965"/>
+              <a:gd name="connsiteX10" fmla="*/ 267369 w 1149684"/>
+              <a:gd name="connsiteY10" fmla="*/ 93579 h 917965"/>
+              <a:gd name="connsiteX11" fmla="*/ 271825 w 1149684"/>
+              <a:gd name="connsiteY11" fmla="*/ 106948 h 917965"/>
+              <a:gd name="connsiteX12" fmla="*/ 298562 w 1149684"/>
+              <a:gd name="connsiteY12" fmla="*/ 124772 h 917965"/>
+              <a:gd name="connsiteX13" fmla="*/ 325298 w 1149684"/>
+              <a:gd name="connsiteY13" fmla="*/ 138141 h 917965"/>
+              <a:gd name="connsiteX14" fmla="*/ 334211 w 1149684"/>
+              <a:gd name="connsiteY14" fmla="*/ 147053 h 917965"/>
+              <a:gd name="connsiteX15" fmla="*/ 343123 w 1149684"/>
+              <a:gd name="connsiteY15" fmla="*/ 160421 h 917965"/>
+              <a:gd name="connsiteX16" fmla="*/ 369860 w 1149684"/>
+              <a:gd name="connsiteY16" fmla="*/ 169334 h 917965"/>
+              <a:gd name="connsiteX17" fmla="*/ 383228 w 1149684"/>
+              <a:gd name="connsiteY17" fmla="*/ 182702 h 917965"/>
+              <a:gd name="connsiteX18" fmla="*/ 409965 w 1149684"/>
+              <a:gd name="connsiteY18" fmla="*/ 191614 h 917965"/>
+              <a:gd name="connsiteX19" fmla="*/ 432246 w 1149684"/>
+              <a:gd name="connsiteY19" fmla="*/ 204983 h 917965"/>
+              <a:gd name="connsiteX20" fmla="*/ 458983 w 1149684"/>
+              <a:gd name="connsiteY20" fmla="*/ 218351 h 917965"/>
+              <a:gd name="connsiteX21" fmla="*/ 467895 w 1149684"/>
+              <a:gd name="connsiteY21" fmla="*/ 227264 h 917965"/>
+              <a:gd name="connsiteX22" fmla="*/ 494632 w 1149684"/>
+              <a:gd name="connsiteY22" fmla="*/ 245088 h 917965"/>
+              <a:gd name="connsiteX23" fmla="*/ 521369 w 1149684"/>
+              <a:gd name="connsiteY23" fmla="*/ 262913 h 917965"/>
+              <a:gd name="connsiteX24" fmla="*/ 534737 w 1149684"/>
+              <a:gd name="connsiteY24" fmla="*/ 276281 h 917965"/>
+              <a:gd name="connsiteX25" fmla="*/ 548105 w 1149684"/>
+              <a:gd name="connsiteY25" fmla="*/ 285193 h 917965"/>
+              <a:gd name="connsiteX26" fmla="*/ 534737 w 1149684"/>
+              <a:gd name="connsiteY26" fmla="*/ 289650 h 917965"/>
+              <a:gd name="connsiteX27" fmla="*/ 570386 w 1149684"/>
+              <a:gd name="connsiteY27" fmla="*/ 320842 h 917965"/>
+              <a:gd name="connsiteX28" fmla="*/ 579298 w 1149684"/>
+              <a:gd name="connsiteY28" fmla="*/ 329755 h 917965"/>
+              <a:gd name="connsiteX29" fmla="*/ 606035 w 1149684"/>
+              <a:gd name="connsiteY29" fmla="*/ 347579 h 917965"/>
+              <a:gd name="connsiteX30" fmla="*/ 628316 w 1149684"/>
+              <a:gd name="connsiteY30" fmla="*/ 365404 h 917965"/>
+              <a:gd name="connsiteX31" fmla="*/ 650597 w 1149684"/>
+              <a:gd name="connsiteY31" fmla="*/ 383228 h 917965"/>
+              <a:gd name="connsiteX32" fmla="*/ 686246 w 1149684"/>
+              <a:gd name="connsiteY32" fmla="*/ 409965 h 917965"/>
+              <a:gd name="connsiteX33" fmla="*/ 699614 w 1149684"/>
+              <a:gd name="connsiteY33" fmla="*/ 418878 h 917965"/>
+              <a:gd name="connsiteX34" fmla="*/ 717439 w 1149684"/>
+              <a:gd name="connsiteY34" fmla="*/ 436702 h 917965"/>
+              <a:gd name="connsiteX35" fmla="*/ 726351 w 1149684"/>
+              <a:gd name="connsiteY35" fmla="*/ 450071 h 917965"/>
+              <a:gd name="connsiteX36" fmla="*/ 730807 w 1149684"/>
+              <a:gd name="connsiteY36" fmla="*/ 463439 h 917965"/>
+              <a:gd name="connsiteX37" fmla="*/ 744176 w 1149684"/>
+              <a:gd name="connsiteY37" fmla="*/ 472351 h 917965"/>
+              <a:gd name="connsiteX38" fmla="*/ 766456 w 1149684"/>
+              <a:gd name="connsiteY38" fmla="*/ 485720 h 917965"/>
+              <a:gd name="connsiteX39" fmla="*/ 775369 w 1149684"/>
+              <a:gd name="connsiteY39" fmla="*/ 494632 h 917965"/>
+              <a:gd name="connsiteX40" fmla="*/ 788737 w 1149684"/>
+              <a:gd name="connsiteY40" fmla="*/ 499088 h 917965"/>
+              <a:gd name="connsiteX41" fmla="*/ 793193 w 1149684"/>
+              <a:gd name="connsiteY41" fmla="*/ 512457 h 917965"/>
+              <a:gd name="connsiteX42" fmla="*/ 806562 w 1149684"/>
+              <a:gd name="connsiteY42" fmla="*/ 521369 h 917965"/>
+              <a:gd name="connsiteX43" fmla="*/ 811018 w 1149684"/>
+              <a:gd name="connsiteY43" fmla="*/ 534737 h 917965"/>
+              <a:gd name="connsiteX44" fmla="*/ 824386 w 1149684"/>
+              <a:gd name="connsiteY44" fmla="*/ 539193 h 917965"/>
+              <a:gd name="connsiteX45" fmla="*/ 851123 w 1149684"/>
+              <a:gd name="connsiteY45" fmla="*/ 557018 h 917965"/>
+              <a:gd name="connsiteX46" fmla="*/ 877860 w 1149684"/>
+              <a:gd name="connsiteY46" fmla="*/ 574842 h 917965"/>
+              <a:gd name="connsiteX47" fmla="*/ 891228 w 1149684"/>
+              <a:gd name="connsiteY47" fmla="*/ 583755 h 917965"/>
+              <a:gd name="connsiteX48" fmla="*/ 900141 w 1149684"/>
+              <a:gd name="connsiteY48" fmla="*/ 592667 h 917965"/>
+              <a:gd name="connsiteX49" fmla="*/ 917965 w 1149684"/>
+              <a:gd name="connsiteY49" fmla="*/ 614948 h 917965"/>
+              <a:gd name="connsiteX50" fmla="*/ 922421 w 1149684"/>
+              <a:gd name="connsiteY50" fmla="*/ 628316 h 917965"/>
+              <a:gd name="connsiteX51" fmla="*/ 940246 w 1149684"/>
+              <a:gd name="connsiteY51" fmla="*/ 650597 h 917965"/>
+              <a:gd name="connsiteX52" fmla="*/ 958070 w 1149684"/>
+              <a:gd name="connsiteY52" fmla="*/ 690702 h 917965"/>
+              <a:gd name="connsiteX53" fmla="*/ 975895 w 1149684"/>
+              <a:gd name="connsiteY53" fmla="*/ 708527 h 917965"/>
+              <a:gd name="connsiteX54" fmla="*/ 984807 w 1149684"/>
+              <a:gd name="connsiteY54" fmla="*/ 721895 h 917965"/>
+              <a:gd name="connsiteX55" fmla="*/ 998176 w 1149684"/>
+              <a:gd name="connsiteY55" fmla="*/ 730807 h 917965"/>
+              <a:gd name="connsiteX56" fmla="*/ 1007088 w 1149684"/>
+              <a:gd name="connsiteY56" fmla="*/ 739720 h 917965"/>
+              <a:gd name="connsiteX57" fmla="*/ 1020456 w 1149684"/>
+              <a:gd name="connsiteY57" fmla="*/ 748632 h 917965"/>
+              <a:gd name="connsiteX58" fmla="*/ 1038281 w 1149684"/>
+              <a:gd name="connsiteY58" fmla="*/ 766457 h 917965"/>
+              <a:gd name="connsiteX59" fmla="*/ 1047193 w 1149684"/>
+              <a:gd name="connsiteY59" fmla="*/ 779825 h 917965"/>
+              <a:gd name="connsiteX60" fmla="*/ 1060562 w 1149684"/>
+              <a:gd name="connsiteY60" fmla="*/ 788737 h 917965"/>
+              <a:gd name="connsiteX61" fmla="*/ 1082842 w 1149684"/>
+              <a:gd name="connsiteY61" fmla="*/ 806562 h 917965"/>
+              <a:gd name="connsiteX62" fmla="*/ 1096211 w 1149684"/>
+              <a:gd name="connsiteY62" fmla="*/ 828842 h 917965"/>
+              <a:gd name="connsiteX63" fmla="*/ 1100667 w 1149684"/>
+              <a:gd name="connsiteY63" fmla="*/ 842211 h 917965"/>
+              <a:gd name="connsiteX64" fmla="*/ 1109579 w 1149684"/>
+              <a:gd name="connsiteY64" fmla="*/ 855579 h 917965"/>
+              <a:gd name="connsiteX65" fmla="*/ 1122948 w 1149684"/>
+              <a:gd name="connsiteY65" fmla="*/ 886772 h 917965"/>
+              <a:gd name="connsiteX66" fmla="*/ 1127404 w 1149684"/>
+              <a:gd name="connsiteY66" fmla="*/ 900141 h 917965"/>
+              <a:gd name="connsiteX67" fmla="*/ 1149684 w 1149684"/>
+              <a:gd name="connsiteY67" fmla="*/ 917965 h 917965"/>
+            </a:gdLst>
+            <a:ahLst/>
+            <a:cxnLst>
+              <a:cxn ang="0">
+                <a:pos x="connsiteX0" y="connsiteY0"/>
+              </a:cxn>
+              <a:cxn ang="0">
+                <a:pos x="connsiteX1" y="connsiteY1"/>
+              </a:cxn>
+              <a:cxn ang="0">
+                <a:pos x="connsiteX2" y="connsiteY2"/>
+              </a:cxn>
+              <a:cxn ang="0">
+                <a:pos x="connsiteX3" y="connsiteY3"/>
+              </a:cxn>
+              <a:cxn ang="0">
+                <a:pos x="connsiteX4" y="connsiteY4"/>
+              </a:cxn>
+              <a:cxn ang="0">
+                <a:pos x="connsiteX5" y="connsiteY5"/>
+              </a:cxn>
+              <a:cxn ang="0">
+                <a:pos x="connsiteX6" y="connsiteY6"/>
+              </a:cxn>
+              <a:cxn ang="0">
+                <a:pos x="connsiteX7" y="connsiteY7"/>
+              </a:cxn>
+              <a:cxn ang="0">
+                <a:pos x="connsiteX8" y="connsiteY8"/>
+              </a:cxn>
+              <a:cxn ang="0">
+                <a:pos x="connsiteX9" y="connsiteY9"/>
+              </a:cxn>
+              <a:cxn ang="0">
+                <a:pos x="connsiteX10" y="connsiteY10"/>
+              </a:cxn>
+              <a:cxn ang="0">
+                <a:pos x="connsiteX11" y="connsiteY11"/>
+              </a:cxn>
+              <a:cxn ang="0">
+                <a:pos x="connsiteX12" y="connsiteY12"/>
+              </a:cxn>
+              <a:cxn ang="0">
+                <a:pos x="connsiteX13" y="connsiteY13"/>
+              </a:cxn>
+              <a:cxn ang="0">
+                <a:pos x="connsiteX14" y="connsiteY14"/>
+              </a:cxn>
+              <a:cxn ang="0">
+                <a:pos x="connsiteX15" y="connsiteY15"/>
+              </a:cxn>
+              <a:cxn ang="0">
+                <a:pos x="connsiteX16" y="connsiteY16"/>
+              </a:cxn>
+              <a:cxn ang="0">
+                <a:pos x="connsiteX17" y="connsiteY17"/>
+              </a:cxn>
+              <a:cxn ang="0">
+                <a:pos x="connsiteX18" y="connsiteY18"/>
+              </a:cxn>
+              <a:cxn ang="0">
+                <a:pos x="connsiteX19" y="connsiteY19"/>
+              </a:cxn>
+              <a:cxn ang="0">
+                <a:pos x="connsiteX20" y="connsiteY20"/>
+              </a:cxn>
+              <a:cxn ang="0">
+                <a:pos x="connsiteX21" y="connsiteY21"/>
+              </a:cxn>
+              <a:cxn ang="0">
+                <a:pos x="connsiteX22" y="connsiteY22"/>
+              </a:cxn>
+              <a:cxn ang="0">
+                <a:pos x="connsiteX23" y="connsiteY23"/>
+              </a:cxn>
+              <a:cxn ang="0">
+                <a:pos x="connsiteX24" y="connsiteY24"/>
+              </a:cxn>
+              <a:cxn ang="0">
+                <a:pos x="connsiteX25" y="connsiteY25"/>
+              </a:cxn>
+              <a:cxn ang="0">
+                <a:pos x="connsiteX26" y="connsiteY26"/>
+              </a:cxn>
+              <a:cxn ang="0">
+                <a:pos x="connsiteX27" y="connsiteY27"/>
+              </a:cxn>
+              <a:cxn ang="0">
+                <a:pos x="connsiteX28" y="connsiteY28"/>
+              </a:cxn>
+              <a:cxn ang="0">
+                <a:pos x="connsiteX29" y="connsiteY29"/>
+              </a:cxn>
+              <a:cxn ang="0">
+                <a:pos x="connsiteX30" y="connsiteY30"/>
+              </a:cxn>
+              <a:cxn ang="0">
+                <a:pos x="connsiteX31" y="connsiteY31"/>
+              </a:cxn>
+              <a:cxn ang="0">
+                <a:pos x="connsiteX32" y="connsiteY32"/>
+              </a:cxn>
+              <a:cxn ang="0">
+                <a:pos x="connsiteX33" y="connsiteY33"/>
+              </a:cxn>
+              <a:cxn ang="0">
+                <a:pos x="connsiteX34" y="connsiteY34"/>
+              </a:cxn>
+              <a:cxn ang="0">
+                <a:pos x="connsiteX35" y="connsiteY35"/>
+              </a:cxn>
+              <a:cxn ang="0">
+                <a:pos x="connsiteX36" y="connsiteY36"/>
+              </a:cxn>
+              <a:cxn ang="0">
+                <a:pos x="connsiteX37" y="connsiteY37"/>
+              </a:cxn>
+              <a:cxn ang="0">
+                <a:pos x="connsiteX38" y="connsiteY38"/>
+              </a:cxn>
+              <a:cxn ang="0">
+                <a:pos x="connsiteX39" y="connsiteY39"/>
+              </a:cxn>
+              <a:cxn ang="0">
+                <a:pos x="connsiteX40" y="connsiteY40"/>
+              </a:cxn>
+              <a:cxn ang="0">
+                <a:pos x="connsiteX41" y="connsiteY41"/>
+              </a:cxn>
+              <a:cxn ang="0">
+                <a:pos x="connsiteX42" y="connsiteY42"/>
+              </a:cxn>
+              <a:cxn ang="0">
+                <a:pos x="connsiteX43" y="connsiteY43"/>
+              </a:cxn>
+              <a:cxn ang="0">
+                <a:pos x="connsiteX44" y="connsiteY44"/>
+              </a:cxn>
+              <a:cxn ang="0">
+                <a:pos x="connsiteX45" y="connsiteY45"/>
+              </a:cxn>
+              <a:cxn ang="0">
+                <a:pos x="connsiteX46" y="connsiteY46"/>
+              </a:cxn>
+              <a:cxn ang="0">
+                <a:pos x="connsiteX47" y="connsiteY47"/>
+              </a:cxn>
+              <a:cxn ang="0">
+                <a:pos x="connsiteX48" y="connsiteY48"/>
+              </a:cxn>
+              <a:cxn ang="0">
+                <a:pos x="connsiteX49" y="connsiteY49"/>
+              </a:cxn>
+              <a:cxn ang="0">
+                <a:pos x="connsiteX50" y="connsiteY50"/>
+              </a:cxn>
+              <a:cxn ang="0">
+                <a:pos x="connsiteX51" y="connsiteY51"/>
+              </a:cxn>
+              <a:cxn ang="0">
+                <a:pos x="connsiteX52" y="connsiteY52"/>
+              </a:cxn>
+              <a:cxn ang="0">
+                <a:pos x="connsiteX53" y="connsiteY53"/>
+              </a:cxn>
+              <a:cxn ang="0">
+                <a:pos x="connsiteX54" y="connsiteY54"/>
+              </a:cxn>
+              <a:cxn ang="0">
+                <a:pos x="connsiteX55" y="connsiteY55"/>
+              </a:cxn>
+              <a:cxn ang="0">
+                <a:pos x="connsiteX56" y="connsiteY56"/>
+              </a:cxn>
+              <a:cxn ang="0">
+                <a:pos x="connsiteX57" y="connsiteY57"/>
+              </a:cxn>
+              <a:cxn ang="0">
+                <a:pos x="connsiteX58" y="connsiteY58"/>
+              </a:cxn>
+              <a:cxn ang="0">
+                <a:pos x="connsiteX59" y="connsiteY59"/>
+              </a:cxn>
+              <a:cxn ang="0">
+                <a:pos x="connsiteX60" y="connsiteY60"/>
+              </a:cxn>
+              <a:cxn ang="0">
+                <a:pos x="connsiteX61" y="connsiteY61"/>
+              </a:cxn>
+              <a:cxn ang="0">
+                <a:pos x="connsiteX62" y="connsiteY62"/>
+              </a:cxn>
+              <a:cxn ang="0">
+                <a:pos x="connsiteX63" y="connsiteY63"/>
+              </a:cxn>
+              <a:cxn ang="0">
+                <a:pos x="connsiteX64" y="connsiteY64"/>
+              </a:cxn>
+              <a:cxn ang="0">
+                <a:pos x="connsiteX65" y="connsiteY65"/>
+              </a:cxn>
+              <a:cxn ang="0">
+                <a:pos x="connsiteX66" y="connsiteY66"/>
+              </a:cxn>
+              <a:cxn ang="0">
+                <a:pos x="connsiteX67" y="connsiteY67"/>
+              </a:cxn>
+            </a:cxnLst>
+            <a:rect l="l" t="t" r="r" b="b"/>
+            <a:pathLst>
+              <a:path w="1149684" h="917965">
+                <a:moveTo>
+                  <a:pt x="0" y="0"/>
+                </a:moveTo>
+                <a:cubicBezTo>
+                  <a:pt x="7427" y="2971"/>
+                  <a:pt x="15126" y="5336"/>
+                  <a:pt x="22281" y="8913"/>
+                </a:cubicBezTo>
+                <a:cubicBezTo>
+                  <a:pt x="56828" y="26187"/>
+                  <a:pt x="15420" y="11082"/>
+                  <a:pt x="49018" y="22281"/>
+                </a:cubicBezTo>
+                <a:cubicBezTo>
+                  <a:pt x="53474" y="25252"/>
+                  <a:pt x="57596" y="28798"/>
+                  <a:pt x="62386" y="31193"/>
+                </a:cubicBezTo>
+                <a:cubicBezTo>
+                  <a:pt x="69878" y="34939"/>
+                  <a:pt x="86434" y="37963"/>
+                  <a:pt x="93579" y="40106"/>
+                </a:cubicBezTo>
+                <a:cubicBezTo>
+                  <a:pt x="102577" y="42805"/>
+                  <a:pt x="111404" y="46047"/>
+                  <a:pt x="120316" y="49018"/>
+                </a:cubicBezTo>
+                <a:lnTo>
+                  <a:pt x="160421" y="62386"/>
+                </a:lnTo>
+                <a:cubicBezTo>
+                  <a:pt x="164877" y="63871"/>
+                  <a:pt x="169184" y="65921"/>
+                  <a:pt x="173790" y="66842"/>
+                </a:cubicBezTo>
+                <a:cubicBezTo>
+                  <a:pt x="196071" y="71298"/>
+                  <a:pt x="219076" y="73026"/>
+                  <a:pt x="240632" y="80211"/>
+                </a:cubicBezTo>
+                <a:cubicBezTo>
+                  <a:pt x="245088" y="81696"/>
+                  <a:pt x="249799" y="82566"/>
+                  <a:pt x="254000" y="84667"/>
+                </a:cubicBezTo>
+                <a:cubicBezTo>
+                  <a:pt x="258790" y="87062"/>
+                  <a:pt x="262913" y="90608"/>
+                  <a:pt x="267369" y="93579"/>
+                </a:cubicBezTo>
+                <a:cubicBezTo>
+                  <a:pt x="268854" y="98035"/>
+                  <a:pt x="268503" y="103626"/>
+                  <a:pt x="271825" y="106948"/>
+                </a:cubicBezTo>
+                <a:cubicBezTo>
+                  <a:pt x="279399" y="114522"/>
+                  <a:pt x="289650" y="118830"/>
+                  <a:pt x="298562" y="124772"/>
+                </a:cubicBezTo>
+                <a:cubicBezTo>
+                  <a:pt x="315841" y="136292"/>
+                  <a:pt x="306846" y="131990"/>
+                  <a:pt x="325298" y="138141"/>
+                </a:cubicBezTo>
+                <a:cubicBezTo>
+                  <a:pt x="328269" y="141112"/>
+                  <a:pt x="331586" y="143772"/>
+                  <a:pt x="334211" y="147053"/>
+                </a:cubicBezTo>
+                <a:cubicBezTo>
+                  <a:pt x="337557" y="151235"/>
+                  <a:pt x="338582" y="157583"/>
+                  <a:pt x="343123" y="160421"/>
+                </a:cubicBezTo>
+                <a:cubicBezTo>
+                  <a:pt x="351089" y="165400"/>
+                  <a:pt x="369860" y="169334"/>
+                  <a:pt x="369860" y="169334"/>
+                </a:cubicBezTo>
+                <a:cubicBezTo>
+                  <a:pt x="374316" y="173790"/>
+                  <a:pt x="377719" y="179642"/>
+                  <a:pt x="383228" y="182702"/>
+                </a:cubicBezTo>
+                <a:cubicBezTo>
+                  <a:pt x="391440" y="187264"/>
+                  <a:pt x="409965" y="191614"/>
+                  <a:pt x="409965" y="191614"/>
+                </a:cubicBezTo>
+                <a:cubicBezTo>
+                  <a:pt x="427371" y="209022"/>
+                  <a:pt x="409108" y="193414"/>
+                  <a:pt x="432246" y="204983"/>
+                </a:cubicBezTo>
+                <a:cubicBezTo>
+                  <a:pt x="466800" y="222259"/>
+                  <a:pt x="425379" y="207150"/>
+                  <a:pt x="458983" y="218351"/>
+                </a:cubicBezTo>
+                <a:cubicBezTo>
+                  <a:pt x="461954" y="221322"/>
+                  <a:pt x="464534" y="224743"/>
+                  <a:pt x="467895" y="227264"/>
+                </a:cubicBezTo>
+                <a:cubicBezTo>
+                  <a:pt x="476464" y="233691"/>
+                  <a:pt x="487058" y="237514"/>
+                  <a:pt x="494632" y="245088"/>
+                </a:cubicBezTo>
+                <a:cubicBezTo>
+                  <a:pt x="511321" y="261779"/>
+                  <a:pt x="502021" y="256464"/>
+                  <a:pt x="521369" y="262913"/>
+                </a:cubicBezTo>
+                <a:cubicBezTo>
+                  <a:pt x="525825" y="267369"/>
+                  <a:pt x="529896" y="272247"/>
+                  <a:pt x="534737" y="276281"/>
+                </a:cubicBezTo>
+                <a:cubicBezTo>
+                  <a:pt x="538851" y="279709"/>
+                  <a:pt x="548105" y="279838"/>
+                  <a:pt x="548105" y="285193"/>
+                </a:cubicBezTo>
+                <a:cubicBezTo>
+                  <a:pt x="548105" y="289890"/>
+                  <a:pt x="539193" y="288164"/>
+                  <a:pt x="534737" y="289650"/>
+                </a:cubicBezTo>
+                <a:cubicBezTo>
+                  <a:pt x="559995" y="327536"/>
+                  <a:pt x="518384" y="268835"/>
+                  <a:pt x="570386" y="320842"/>
+                </a:cubicBezTo>
+                <a:cubicBezTo>
+                  <a:pt x="573357" y="323813"/>
+                  <a:pt x="575937" y="327234"/>
+                  <a:pt x="579298" y="329755"/>
+                </a:cubicBezTo>
+                <a:cubicBezTo>
+                  <a:pt x="587867" y="336182"/>
+                  <a:pt x="598461" y="340005"/>
+                  <a:pt x="606035" y="347579"/>
+                </a:cubicBezTo>
+                <a:cubicBezTo>
+                  <a:pt x="618735" y="360279"/>
+                  <a:pt x="611452" y="354161"/>
+                  <a:pt x="628316" y="365404"/>
+                </a:cubicBezTo>
+                <a:cubicBezTo>
+                  <a:pt x="651520" y="400211"/>
+                  <a:pt x="621897" y="361703"/>
+                  <a:pt x="650597" y="383228"/>
+                </a:cubicBezTo>
+                <a:cubicBezTo>
+                  <a:pt x="691560" y="413951"/>
+                  <a:pt x="656042" y="399898"/>
+                  <a:pt x="686246" y="409965"/>
+                </a:cubicBezTo>
+                <a:cubicBezTo>
+                  <a:pt x="690702" y="412936"/>
+                  <a:pt x="696268" y="414696"/>
+                  <a:pt x="699614" y="418878"/>
+                </a:cubicBezTo>
+                <a:cubicBezTo>
+                  <a:pt x="716897" y="440482"/>
+                  <a:pt x="688272" y="426980"/>
+                  <a:pt x="717439" y="436702"/>
+                </a:cubicBezTo>
+                <a:cubicBezTo>
+                  <a:pt x="720410" y="441158"/>
+                  <a:pt x="723956" y="445281"/>
+                  <a:pt x="726351" y="450071"/>
+                </a:cubicBezTo>
+                <a:cubicBezTo>
+                  <a:pt x="728452" y="454272"/>
+                  <a:pt x="727873" y="459771"/>
+                  <a:pt x="730807" y="463439"/>
+                </a:cubicBezTo>
+                <a:cubicBezTo>
+                  <a:pt x="734153" y="467621"/>
+                  <a:pt x="739994" y="469005"/>
+                  <a:pt x="744176" y="472351"/>
+                </a:cubicBezTo>
+                <a:cubicBezTo>
+                  <a:pt x="761654" y="486334"/>
+                  <a:pt x="743238" y="477981"/>
+                  <a:pt x="766456" y="485720"/>
+                </a:cubicBezTo>
+                <a:cubicBezTo>
+                  <a:pt x="769427" y="488691"/>
+                  <a:pt x="771766" y="492470"/>
+                  <a:pt x="775369" y="494632"/>
+                </a:cubicBezTo>
+                <a:cubicBezTo>
+                  <a:pt x="779397" y="497049"/>
+                  <a:pt x="785416" y="495767"/>
+                  <a:pt x="788737" y="499088"/>
+                </a:cubicBezTo>
+                <a:cubicBezTo>
+                  <a:pt x="792058" y="502410"/>
+                  <a:pt x="790259" y="508789"/>
+                  <a:pt x="793193" y="512457"/>
+                </a:cubicBezTo>
+                <a:cubicBezTo>
+                  <a:pt x="796539" y="516639"/>
+                  <a:pt x="802106" y="518398"/>
+                  <a:pt x="806562" y="521369"/>
+                </a:cubicBezTo>
+                <a:cubicBezTo>
+                  <a:pt x="808047" y="525825"/>
+                  <a:pt x="807697" y="531416"/>
+                  <a:pt x="811018" y="534737"/>
+                </a:cubicBezTo>
+                <a:cubicBezTo>
+                  <a:pt x="814339" y="538058"/>
+                  <a:pt x="820280" y="536912"/>
+                  <a:pt x="824386" y="539193"/>
+                </a:cubicBezTo>
+                <a:cubicBezTo>
+                  <a:pt x="833749" y="544395"/>
+                  <a:pt x="842211" y="551076"/>
+                  <a:pt x="851123" y="557018"/>
+                </a:cubicBezTo>
+                <a:lnTo>
+                  <a:pt x="877860" y="574842"/>
+                </a:lnTo>
+                <a:cubicBezTo>
+                  <a:pt x="882316" y="577813"/>
+                  <a:pt x="887441" y="579968"/>
+                  <a:pt x="891228" y="583755"/>
+                </a:cubicBezTo>
+                <a:cubicBezTo>
+                  <a:pt x="894199" y="586726"/>
+                  <a:pt x="897516" y="589386"/>
+                  <a:pt x="900141" y="592667"/>
+                </a:cubicBezTo>
+                <a:cubicBezTo>
+                  <a:pt x="922637" y="620786"/>
+                  <a:pt x="896438" y="593418"/>
+                  <a:pt x="917965" y="614948"/>
+                </a:cubicBezTo>
+                <a:cubicBezTo>
+                  <a:pt x="919450" y="619404"/>
+                  <a:pt x="920320" y="624115"/>
+                  <a:pt x="922421" y="628316"/>
+                </a:cubicBezTo>
+                <a:cubicBezTo>
+                  <a:pt x="928044" y="639562"/>
+                  <a:pt x="931954" y="642306"/>
+                  <a:pt x="940246" y="650597"/>
+                </a:cubicBezTo>
+                <a:cubicBezTo>
+                  <a:pt x="946347" y="668901"/>
+                  <a:pt x="946515" y="677221"/>
+                  <a:pt x="958070" y="690702"/>
+                </a:cubicBezTo>
+                <a:cubicBezTo>
+                  <a:pt x="963538" y="697082"/>
+                  <a:pt x="971234" y="701535"/>
+                  <a:pt x="975895" y="708527"/>
+                </a:cubicBezTo>
+                <a:cubicBezTo>
+                  <a:pt x="978866" y="712983"/>
+                  <a:pt x="981020" y="718108"/>
+                  <a:pt x="984807" y="721895"/>
+                </a:cubicBezTo>
+                <a:cubicBezTo>
+                  <a:pt x="988594" y="725682"/>
+                  <a:pt x="993994" y="727461"/>
+                  <a:pt x="998176" y="730807"/>
+                </a:cubicBezTo>
+                <a:cubicBezTo>
+                  <a:pt x="1001457" y="733432"/>
+                  <a:pt x="1003807" y="737095"/>
+                  <a:pt x="1007088" y="739720"/>
+                </a:cubicBezTo>
+                <a:cubicBezTo>
+                  <a:pt x="1011270" y="743066"/>
+                  <a:pt x="1016390" y="745147"/>
+                  <a:pt x="1020456" y="748632"/>
+                </a:cubicBezTo>
+                <a:cubicBezTo>
+                  <a:pt x="1026836" y="754100"/>
+                  <a:pt x="1033620" y="759465"/>
+                  <a:pt x="1038281" y="766457"/>
+                </a:cubicBezTo>
+                <a:cubicBezTo>
+                  <a:pt x="1041252" y="770913"/>
+                  <a:pt x="1043406" y="776038"/>
+                  <a:pt x="1047193" y="779825"/>
+                </a:cubicBezTo>
+                <a:cubicBezTo>
+                  <a:pt x="1050980" y="783612"/>
+                  <a:pt x="1056380" y="785391"/>
+                  <a:pt x="1060562" y="788737"/>
+                </a:cubicBezTo>
+                <a:cubicBezTo>
+                  <a:pt x="1092317" y="814141"/>
+                  <a:pt x="1041687" y="779125"/>
+                  <a:pt x="1082842" y="806562"/>
+                </a:cubicBezTo>
+                <a:cubicBezTo>
+                  <a:pt x="1095466" y="844434"/>
+                  <a:pt x="1077859" y="798256"/>
+                  <a:pt x="1096211" y="828842"/>
+                </a:cubicBezTo>
+                <a:cubicBezTo>
+                  <a:pt x="1098628" y="832870"/>
+                  <a:pt x="1098566" y="838010"/>
+                  <a:pt x="1100667" y="842211"/>
+                </a:cubicBezTo>
+                <a:cubicBezTo>
+                  <a:pt x="1103062" y="847001"/>
+                  <a:pt x="1106608" y="851123"/>
+                  <a:pt x="1109579" y="855579"/>
+                </a:cubicBezTo>
+                <a:cubicBezTo>
+                  <a:pt x="1118853" y="892679"/>
+                  <a:pt x="1107560" y="855997"/>
+                  <a:pt x="1122948" y="886772"/>
+                </a:cubicBezTo>
+                <a:cubicBezTo>
+                  <a:pt x="1125049" y="890973"/>
+                  <a:pt x="1124798" y="896233"/>
+                  <a:pt x="1127404" y="900141"/>
+                </a:cubicBezTo>
+                <a:cubicBezTo>
+                  <a:pt x="1135262" y="911928"/>
+                  <a:pt x="1139277" y="912762"/>
+                  <a:pt x="1149684" y="917965"/>
+                </a:cubicBezTo>
+              </a:path>
+            </a:pathLst>
+          </a:custGeom>
+          <a:ln w="28575" cmpd="sng">
+            <a:solidFill>
+              <a:srgbClr val="FFC000">
+                <a:alpha val="50000"/>
+              </a:srgbClr>
+            </a:solidFill>
+          </a:ln>
+        </p:spPr>
+        <p:style>
+          <a:lnRef idx="2">
+            <a:schemeClr val="accent1"/>
+          </a:lnRef>
+          <a:fillRef idx="0">
+            <a:schemeClr val="accent1"/>
+          </a:fillRef>
+          <a:effectRef idx="1">
+            <a:schemeClr val="accent1"/>
+          </a:effectRef>
+          <a:fontRef idx="minor">
+            <a:schemeClr val="tx1"/>
+          </a:fontRef>
+        </p:style>
+        <p:txBody>
+          <a:bodyPr rtlCol="0" anchor="ctr"/>
+          <a:lstStyle/>
+          <a:p>
+            <a:pPr algn="ctr"/>
+            <a:endParaRPr lang="en-US"/>
+          </a:p>
+        </p:txBody>
+      </p:sp>
+      <p:sp>
+        <p:nvSpPr>
+          <p:cNvPr id="17" name="Freeform 16"/>
+          <p:cNvSpPr/>
+          <p:nvPr/>
+        </p:nvSpPr>
+        <p:spPr>
+          <a:xfrm>
+            <a:off x="9732211" y="1336842"/>
+            <a:ext cx="589229" cy="935790"/>
+          </a:xfrm>
+          <a:custGeom>
+            <a:avLst/>
+            <a:gdLst>
+              <a:gd name="connsiteX0" fmla="*/ 0 w 589229"/>
+              <a:gd name="connsiteY0" fmla="*/ 935790 h 935790"/>
+              <a:gd name="connsiteX1" fmla="*/ 22280 w 589229"/>
+              <a:gd name="connsiteY1" fmla="*/ 931333 h 935790"/>
+              <a:gd name="connsiteX2" fmla="*/ 26736 w 589229"/>
+              <a:gd name="connsiteY2" fmla="*/ 917965 h 935790"/>
+              <a:gd name="connsiteX3" fmla="*/ 44561 w 589229"/>
+              <a:gd name="connsiteY3" fmla="*/ 900140 h 935790"/>
+              <a:gd name="connsiteX4" fmla="*/ 53473 w 589229"/>
+              <a:gd name="connsiteY4" fmla="*/ 886772 h 935790"/>
+              <a:gd name="connsiteX5" fmla="*/ 66842 w 589229"/>
+              <a:gd name="connsiteY5" fmla="*/ 864491 h 935790"/>
+              <a:gd name="connsiteX6" fmla="*/ 80210 w 589229"/>
+              <a:gd name="connsiteY6" fmla="*/ 860035 h 935790"/>
+              <a:gd name="connsiteX7" fmla="*/ 89122 w 589229"/>
+              <a:gd name="connsiteY7" fmla="*/ 846667 h 935790"/>
+              <a:gd name="connsiteX8" fmla="*/ 98035 w 589229"/>
+              <a:gd name="connsiteY8" fmla="*/ 837754 h 935790"/>
+              <a:gd name="connsiteX9" fmla="*/ 124771 w 589229"/>
+              <a:gd name="connsiteY9" fmla="*/ 802105 h 935790"/>
+              <a:gd name="connsiteX10" fmla="*/ 151508 w 589229"/>
+              <a:gd name="connsiteY10" fmla="*/ 784281 h 935790"/>
+              <a:gd name="connsiteX11" fmla="*/ 182701 w 589229"/>
+              <a:gd name="connsiteY11" fmla="*/ 757544 h 935790"/>
+              <a:gd name="connsiteX12" fmla="*/ 187157 w 589229"/>
+              <a:gd name="connsiteY12" fmla="*/ 744176 h 935790"/>
+              <a:gd name="connsiteX13" fmla="*/ 209438 w 589229"/>
+              <a:gd name="connsiteY13" fmla="*/ 721895 h 935790"/>
+              <a:gd name="connsiteX14" fmla="*/ 218350 w 589229"/>
+              <a:gd name="connsiteY14" fmla="*/ 690702 h 935790"/>
+              <a:gd name="connsiteX15" fmla="*/ 222807 w 589229"/>
+              <a:gd name="connsiteY15" fmla="*/ 677333 h 935790"/>
+              <a:gd name="connsiteX16" fmla="*/ 240631 w 589229"/>
+              <a:gd name="connsiteY16" fmla="*/ 650597 h 935790"/>
+              <a:gd name="connsiteX17" fmla="*/ 258456 w 589229"/>
+              <a:gd name="connsiteY17" fmla="*/ 632772 h 935790"/>
+              <a:gd name="connsiteX18" fmla="*/ 271824 w 589229"/>
+              <a:gd name="connsiteY18" fmla="*/ 606035 h 935790"/>
+              <a:gd name="connsiteX19" fmla="*/ 280736 w 589229"/>
+              <a:gd name="connsiteY19" fmla="*/ 588211 h 935790"/>
+              <a:gd name="connsiteX20" fmla="*/ 298561 w 589229"/>
+              <a:gd name="connsiteY20" fmla="*/ 561474 h 935790"/>
+              <a:gd name="connsiteX21" fmla="*/ 316385 w 589229"/>
+              <a:gd name="connsiteY21" fmla="*/ 534737 h 935790"/>
+              <a:gd name="connsiteX22" fmla="*/ 325298 w 589229"/>
+              <a:gd name="connsiteY22" fmla="*/ 521369 h 935790"/>
+              <a:gd name="connsiteX23" fmla="*/ 347578 w 589229"/>
+              <a:gd name="connsiteY23" fmla="*/ 499088 h 935790"/>
+              <a:gd name="connsiteX24" fmla="*/ 360947 w 589229"/>
+              <a:gd name="connsiteY24" fmla="*/ 454526 h 935790"/>
+              <a:gd name="connsiteX25" fmla="*/ 374315 w 589229"/>
+              <a:gd name="connsiteY25" fmla="*/ 441158 h 935790"/>
+              <a:gd name="connsiteX26" fmla="*/ 387684 w 589229"/>
+              <a:gd name="connsiteY26" fmla="*/ 401053 h 935790"/>
+              <a:gd name="connsiteX27" fmla="*/ 392140 w 589229"/>
+              <a:gd name="connsiteY27" fmla="*/ 387684 h 935790"/>
+              <a:gd name="connsiteX28" fmla="*/ 396596 w 589229"/>
+              <a:gd name="connsiteY28" fmla="*/ 369860 h 935790"/>
+              <a:gd name="connsiteX29" fmla="*/ 405508 w 589229"/>
+              <a:gd name="connsiteY29" fmla="*/ 360947 h 935790"/>
+              <a:gd name="connsiteX30" fmla="*/ 414421 w 589229"/>
+              <a:gd name="connsiteY30" fmla="*/ 347579 h 935790"/>
+              <a:gd name="connsiteX31" fmla="*/ 418877 w 589229"/>
+              <a:gd name="connsiteY31" fmla="*/ 334211 h 935790"/>
+              <a:gd name="connsiteX32" fmla="*/ 441157 w 589229"/>
+              <a:gd name="connsiteY32" fmla="*/ 303018 h 935790"/>
+              <a:gd name="connsiteX33" fmla="*/ 450070 w 589229"/>
+              <a:gd name="connsiteY33" fmla="*/ 285193 h 935790"/>
+              <a:gd name="connsiteX34" fmla="*/ 467894 w 589229"/>
+              <a:gd name="connsiteY34" fmla="*/ 258456 h 935790"/>
+              <a:gd name="connsiteX35" fmla="*/ 476807 w 589229"/>
+              <a:gd name="connsiteY35" fmla="*/ 240632 h 935790"/>
+              <a:gd name="connsiteX36" fmla="*/ 490175 w 589229"/>
+              <a:gd name="connsiteY36" fmla="*/ 209439 h 935790"/>
+              <a:gd name="connsiteX37" fmla="*/ 499087 w 589229"/>
+              <a:gd name="connsiteY37" fmla="*/ 200526 h 935790"/>
+              <a:gd name="connsiteX38" fmla="*/ 503543 w 589229"/>
+              <a:gd name="connsiteY38" fmla="*/ 187158 h 935790"/>
+              <a:gd name="connsiteX39" fmla="*/ 508000 w 589229"/>
+              <a:gd name="connsiteY39" fmla="*/ 160421 h 935790"/>
+              <a:gd name="connsiteX40" fmla="*/ 525824 w 589229"/>
+              <a:gd name="connsiteY40" fmla="*/ 138140 h 935790"/>
+              <a:gd name="connsiteX41" fmla="*/ 543649 w 589229"/>
+              <a:gd name="connsiteY41" fmla="*/ 98035 h 935790"/>
+              <a:gd name="connsiteX42" fmla="*/ 557017 w 589229"/>
+              <a:gd name="connsiteY42" fmla="*/ 57930 h 935790"/>
+              <a:gd name="connsiteX43" fmla="*/ 561473 w 589229"/>
+              <a:gd name="connsiteY43" fmla="*/ 44562 h 935790"/>
+              <a:gd name="connsiteX44" fmla="*/ 570385 w 589229"/>
+              <a:gd name="connsiteY44" fmla="*/ 35649 h 935790"/>
+              <a:gd name="connsiteX45" fmla="*/ 574842 w 589229"/>
+              <a:gd name="connsiteY45" fmla="*/ 22281 h 935790"/>
+              <a:gd name="connsiteX46" fmla="*/ 588210 w 589229"/>
+              <a:gd name="connsiteY46" fmla="*/ 13369 h 935790"/>
+              <a:gd name="connsiteX47" fmla="*/ 588210 w 589229"/>
+              <a:gd name="connsiteY47" fmla="*/ 0 h 935790"/>
+            </a:gdLst>
+            <a:ahLst/>
+            <a:cxnLst>
+              <a:cxn ang="0">
+                <a:pos x="connsiteX0" y="connsiteY0"/>
+              </a:cxn>
+              <a:cxn ang="0">
+                <a:pos x="connsiteX1" y="connsiteY1"/>
+              </a:cxn>
+              <a:cxn ang="0">
+                <a:pos x="connsiteX2" y="connsiteY2"/>
+              </a:cxn>
+              <a:cxn ang="0">
+                <a:pos x="connsiteX3" y="connsiteY3"/>
+              </a:cxn>
+              <a:cxn ang="0">
+                <a:pos x="connsiteX4" y="connsiteY4"/>
+              </a:cxn>
+              <a:cxn ang="0">
+                <a:pos x="connsiteX5" y="connsiteY5"/>
+              </a:cxn>
+              <a:cxn ang="0">
+                <a:pos x="connsiteX6" y="connsiteY6"/>
+              </a:cxn>
+              <a:cxn ang="0">
+                <a:pos x="connsiteX7" y="connsiteY7"/>
+              </a:cxn>
+              <a:cxn ang="0">
+                <a:pos x="connsiteX8" y="connsiteY8"/>
+              </a:cxn>
+              <a:cxn ang="0">
+                <a:pos x="connsiteX9" y="connsiteY9"/>
+              </a:cxn>
+              <a:cxn ang="0">
+                <a:pos x="connsiteX10" y="connsiteY10"/>
+              </a:cxn>
+              <a:cxn ang="0">
+                <a:pos x="connsiteX11" y="connsiteY11"/>
+              </a:cxn>
+              <a:cxn ang="0">
+                <a:pos x="connsiteX12" y="connsiteY12"/>
+              </a:cxn>
+              <a:cxn ang="0">
+                <a:pos x="connsiteX13" y="connsiteY13"/>
+              </a:cxn>
+              <a:cxn ang="0">
+                <a:pos x="connsiteX14" y="connsiteY14"/>
+              </a:cxn>
+              <a:cxn ang="0">
+                <a:pos x="connsiteX15" y="connsiteY15"/>
+              </a:cxn>
+              <a:cxn ang="0">
+                <a:pos x="connsiteX16" y="connsiteY16"/>
+              </a:cxn>
+              <a:cxn ang="0">
+                <a:pos x="connsiteX17" y="connsiteY17"/>
+              </a:cxn>
+              <a:cxn ang="0">
+                <a:pos x="connsiteX18" y="connsiteY18"/>
+              </a:cxn>
+              <a:cxn ang="0">
+                <a:pos x="connsiteX19" y="connsiteY19"/>
+              </a:cxn>
+              <a:cxn ang="0">
+                <a:pos x="connsiteX20" y="connsiteY20"/>
+              </a:cxn>
+              <a:cxn ang="0">
+                <a:pos x="connsiteX21" y="connsiteY21"/>
+              </a:cxn>
+              <a:cxn ang="0">
+                <a:pos x="connsiteX22" y="connsiteY22"/>
+              </a:cxn>
+              <a:cxn ang="0">
+                <a:pos x="connsiteX23" y="connsiteY23"/>
+              </a:cxn>
+              <a:cxn ang="0">
+                <a:pos x="connsiteX24" y="connsiteY24"/>
+              </a:cxn>
+              <a:cxn ang="0">
+                <a:pos x="connsiteX25" y="connsiteY25"/>
+              </a:cxn>
+              <a:cxn ang="0">
+                <a:pos x="connsiteX26" y="connsiteY26"/>
+              </a:cxn>
+              <a:cxn ang="0">
+                <a:pos x="connsiteX27" y="connsiteY27"/>
+              </a:cxn>
+              <a:cxn ang="0">
+                <a:pos x="connsiteX28" y="connsiteY28"/>
+              </a:cxn>
+              <a:cxn ang="0">
+                <a:pos x="connsiteX29" y="connsiteY29"/>
+              </a:cxn>
+              <a:cxn ang="0">
+                <a:pos x="connsiteX30" y="connsiteY30"/>
+              </a:cxn>
+              <a:cxn ang="0">
+                <a:pos x="connsiteX31" y="connsiteY31"/>
+              </a:cxn>
+              <a:cxn ang="0">
+                <a:pos x="connsiteX32" y="connsiteY32"/>
+              </a:cxn>
+              <a:cxn ang="0">
+                <a:pos x="connsiteX33" y="connsiteY33"/>
+              </a:cxn>
+              <a:cxn ang="0">
+                <a:pos x="connsiteX34" y="connsiteY34"/>
+              </a:cxn>
+              <a:cxn ang="0">
+                <a:pos x="connsiteX35" y="connsiteY35"/>
+              </a:cxn>
+              <a:cxn ang="0">
+                <a:pos x="connsiteX36" y="connsiteY36"/>
+              </a:cxn>
+              <a:cxn ang="0">
+                <a:pos x="connsiteX37" y="connsiteY37"/>
+              </a:cxn>
+              <a:cxn ang="0">
+                <a:pos x="connsiteX38" y="connsiteY38"/>
+              </a:cxn>
+              <a:cxn ang="0">
+                <a:pos x="connsiteX39" y="connsiteY39"/>
+              </a:cxn>
+              <a:cxn ang="0">
+                <a:pos x="connsiteX40" y="connsiteY40"/>
+              </a:cxn>
+              <a:cxn ang="0">
+                <a:pos x="connsiteX41" y="connsiteY41"/>
+              </a:cxn>
+              <a:cxn ang="0">
+                <a:pos x="connsiteX42" y="connsiteY42"/>
+              </a:cxn>
+              <a:cxn ang="0">
+                <a:pos x="connsiteX43" y="connsiteY43"/>
+              </a:cxn>
+              <a:cxn ang="0">
+                <a:pos x="connsiteX44" y="connsiteY44"/>
+              </a:cxn>
+              <a:cxn ang="0">
+                <a:pos x="connsiteX45" y="connsiteY45"/>
+              </a:cxn>
+              <a:cxn ang="0">
+                <a:pos x="connsiteX46" y="connsiteY46"/>
+              </a:cxn>
+              <a:cxn ang="0">
+                <a:pos x="connsiteX47" y="connsiteY47"/>
+              </a:cxn>
+            </a:cxnLst>
+            <a:rect l="l" t="t" r="r" b="b"/>
+            <a:pathLst>
+              <a:path w="589229" h="935790">
+                <a:moveTo>
+                  <a:pt x="0" y="935790"/>
+                </a:moveTo>
+                <a:cubicBezTo>
+                  <a:pt x="7427" y="934304"/>
+                  <a:pt x="15978" y="935534"/>
+                  <a:pt x="22280" y="931333"/>
+                </a:cubicBezTo>
+                <a:cubicBezTo>
+                  <a:pt x="26188" y="928727"/>
+                  <a:pt x="24006" y="921787"/>
+                  <a:pt x="26736" y="917965"/>
+                </a:cubicBezTo>
+                <a:cubicBezTo>
+                  <a:pt x="31620" y="911127"/>
+                  <a:pt x="39900" y="907132"/>
+                  <a:pt x="44561" y="900140"/>
+                </a:cubicBezTo>
+                <a:cubicBezTo>
+                  <a:pt x="47532" y="895684"/>
+                  <a:pt x="51078" y="891562"/>
+                  <a:pt x="53473" y="886772"/>
+                </a:cubicBezTo>
+                <a:cubicBezTo>
+                  <a:pt x="59482" y="874754"/>
+                  <a:pt x="54407" y="871952"/>
+                  <a:pt x="66842" y="864491"/>
+                </a:cubicBezTo>
+                <a:cubicBezTo>
+                  <a:pt x="70870" y="862074"/>
+                  <a:pt x="75754" y="861520"/>
+                  <a:pt x="80210" y="860035"/>
+                </a:cubicBezTo>
+                <a:cubicBezTo>
+                  <a:pt x="83181" y="855579"/>
+                  <a:pt x="85776" y="850849"/>
+                  <a:pt x="89122" y="846667"/>
+                </a:cubicBezTo>
+                <a:cubicBezTo>
+                  <a:pt x="91747" y="843386"/>
+                  <a:pt x="95514" y="841115"/>
+                  <a:pt x="98035" y="837754"/>
+                </a:cubicBezTo>
+                <a:cubicBezTo>
+                  <a:pt x="105929" y="827229"/>
+                  <a:pt x="113095" y="810862"/>
+                  <a:pt x="124771" y="802105"/>
+                </a:cubicBezTo>
+                <a:cubicBezTo>
+                  <a:pt x="133340" y="795678"/>
+                  <a:pt x="143934" y="791855"/>
+                  <a:pt x="151508" y="784281"/>
+                </a:cubicBezTo>
+                <a:cubicBezTo>
+                  <a:pt x="173120" y="762669"/>
+                  <a:pt x="162341" y="771117"/>
+                  <a:pt x="182701" y="757544"/>
+                </a:cubicBezTo>
+                <a:cubicBezTo>
+                  <a:pt x="184186" y="753088"/>
+                  <a:pt x="184339" y="747934"/>
+                  <a:pt x="187157" y="744176"/>
+                </a:cubicBezTo>
+                <a:cubicBezTo>
+                  <a:pt x="193459" y="735773"/>
+                  <a:pt x="209438" y="721895"/>
+                  <a:pt x="209438" y="721895"/>
+                </a:cubicBezTo>
+                <a:cubicBezTo>
+                  <a:pt x="220129" y="689820"/>
+                  <a:pt x="207151" y="729897"/>
+                  <a:pt x="218350" y="690702"/>
+                </a:cubicBezTo>
+                <a:cubicBezTo>
+                  <a:pt x="219641" y="686185"/>
+                  <a:pt x="220526" y="681439"/>
+                  <a:pt x="222807" y="677333"/>
+                </a:cubicBezTo>
+                <a:cubicBezTo>
+                  <a:pt x="228009" y="667970"/>
+                  <a:pt x="233057" y="658171"/>
+                  <a:pt x="240631" y="650597"/>
+                </a:cubicBezTo>
+                <a:lnTo>
+                  <a:pt x="258456" y="632772"/>
+                </a:lnTo>
+                <a:cubicBezTo>
+                  <a:pt x="266625" y="608264"/>
+                  <a:pt x="258004" y="630221"/>
+                  <a:pt x="271824" y="606035"/>
+                </a:cubicBezTo>
+                <a:cubicBezTo>
+                  <a:pt x="275120" y="600268"/>
+                  <a:pt x="277318" y="593907"/>
+                  <a:pt x="280736" y="588211"/>
+                </a:cubicBezTo>
+                <a:cubicBezTo>
+                  <a:pt x="286247" y="579026"/>
+                  <a:pt x="292619" y="570386"/>
+                  <a:pt x="298561" y="561474"/>
+                </a:cubicBezTo>
+                <a:lnTo>
+                  <a:pt x="316385" y="534737"/>
+                </a:lnTo>
+                <a:cubicBezTo>
+                  <a:pt x="319356" y="530281"/>
+                  <a:pt x="321511" y="525156"/>
+                  <a:pt x="325298" y="521369"/>
+                </a:cubicBezTo>
+                <a:lnTo>
+                  <a:pt x="347578" y="499088"/>
+                </a:lnTo>
+                <a:cubicBezTo>
+                  <a:pt x="349597" y="491012"/>
+                  <a:pt x="357333" y="458140"/>
+                  <a:pt x="360947" y="454526"/>
+                </a:cubicBezTo>
+                <a:lnTo>
+                  <a:pt x="374315" y="441158"/>
+                </a:lnTo>
+                <a:lnTo>
+                  <a:pt x="387684" y="401053"/>
+                </a:lnTo>
+                <a:cubicBezTo>
+                  <a:pt x="389169" y="396597"/>
+                  <a:pt x="391001" y="392241"/>
+                  <a:pt x="392140" y="387684"/>
+                </a:cubicBezTo>
+                <a:cubicBezTo>
+                  <a:pt x="393625" y="381743"/>
+                  <a:pt x="393857" y="375338"/>
+                  <a:pt x="396596" y="369860"/>
+                </a:cubicBezTo>
+                <a:cubicBezTo>
+                  <a:pt x="398475" y="366102"/>
+                  <a:pt x="402883" y="364228"/>
+                  <a:pt x="405508" y="360947"/>
+                </a:cubicBezTo>
+                <a:cubicBezTo>
+                  <a:pt x="408854" y="356765"/>
+                  <a:pt x="411450" y="352035"/>
+                  <a:pt x="414421" y="347579"/>
+                </a:cubicBezTo>
+                <a:cubicBezTo>
+                  <a:pt x="415906" y="343123"/>
+                  <a:pt x="416776" y="338412"/>
+                  <a:pt x="418877" y="334211"/>
+                </a:cubicBezTo>
+                <a:cubicBezTo>
+                  <a:pt x="423593" y="324778"/>
+                  <a:pt x="436106" y="311100"/>
+                  <a:pt x="441157" y="303018"/>
+                </a:cubicBezTo>
+                <a:cubicBezTo>
+                  <a:pt x="444678" y="297385"/>
+                  <a:pt x="446652" y="290889"/>
+                  <a:pt x="450070" y="285193"/>
+                </a:cubicBezTo>
+                <a:cubicBezTo>
+                  <a:pt x="455581" y="276008"/>
+                  <a:pt x="463103" y="268036"/>
+                  <a:pt x="467894" y="258456"/>
+                </a:cubicBezTo>
+                <a:cubicBezTo>
+                  <a:pt x="470865" y="252515"/>
+                  <a:pt x="474190" y="246738"/>
+                  <a:pt x="476807" y="240632"/>
+                </a:cubicBezTo>
+                <a:cubicBezTo>
+                  <a:pt x="483939" y="223991"/>
+                  <a:pt x="478348" y="227180"/>
+                  <a:pt x="490175" y="209439"/>
+                </a:cubicBezTo>
+                <a:cubicBezTo>
+                  <a:pt x="492505" y="205943"/>
+                  <a:pt x="496116" y="203497"/>
+                  <a:pt x="499087" y="200526"/>
+                </a:cubicBezTo>
+                <a:cubicBezTo>
+                  <a:pt x="500572" y="196070"/>
+                  <a:pt x="502524" y="191743"/>
+                  <a:pt x="503543" y="187158"/>
+                </a:cubicBezTo>
+                <a:cubicBezTo>
+                  <a:pt x="505503" y="178338"/>
+                  <a:pt x="505143" y="168993"/>
+                  <a:pt x="508000" y="160421"/>
+                </a:cubicBezTo>
+                <a:cubicBezTo>
+                  <a:pt x="510810" y="151990"/>
+                  <a:pt x="519740" y="144224"/>
+                  <a:pt x="525824" y="138140"/>
+                </a:cubicBezTo>
+                <a:cubicBezTo>
+                  <a:pt x="536430" y="106323"/>
+                  <a:pt x="529525" y="119220"/>
+                  <a:pt x="543649" y="98035"/>
+                </a:cubicBezTo>
+                <a:lnTo>
+                  <a:pt x="557017" y="57930"/>
+                </a:lnTo>
+                <a:cubicBezTo>
+                  <a:pt x="558502" y="53474"/>
+                  <a:pt x="558152" y="47883"/>
+                  <a:pt x="561473" y="44562"/>
+                </a:cubicBezTo>
+                <a:lnTo>
+                  <a:pt x="570385" y="35649"/>
+                </a:lnTo>
+                <a:cubicBezTo>
+                  <a:pt x="571871" y="31193"/>
+                  <a:pt x="571908" y="25949"/>
+                  <a:pt x="574842" y="22281"/>
+                </a:cubicBezTo>
+                <a:cubicBezTo>
+                  <a:pt x="578188" y="18099"/>
+                  <a:pt x="585455" y="17961"/>
+                  <a:pt x="588210" y="13369"/>
+                </a:cubicBezTo>
+                <a:cubicBezTo>
+                  <a:pt x="590503" y="9548"/>
+                  <a:pt x="588210" y="4456"/>
+                  <a:pt x="588210" y="0"/>
+                </a:cubicBezTo>
+              </a:path>
+            </a:pathLst>
+          </a:custGeom>
+          <a:ln w="38100" cmpd="sng">
+            <a:solidFill>
+              <a:srgbClr val="FFC000">
+                <a:alpha val="50000"/>
+              </a:srgbClr>
+            </a:solidFill>
+          </a:ln>
+        </p:spPr>
+        <p:style>
+          <a:lnRef idx="2">
+            <a:schemeClr val="accent1"/>
+          </a:lnRef>
+          <a:fillRef idx="0">
+            <a:schemeClr val="accent1"/>
+          </a:fillRef>
+          <a:effectRef idx="1">
+            <a:schemeClr val="accent1"/>
+          </a:effectRef>
+          <a:fontRef idx="minor">
+            <a:schemeClr val="tx1"/>
+          </a:fontRef>
+        </p:style>
+        <p:txBody>
+          <a:bodyPr rtlCol="0" anchor="ctr"/>
+          <a:lstStyle/>
+          <a:p>
+            <a:pPr algn="ctr"/>
+            <a:endParaRPr lang="en-US"/>
+          </a:p>
+        </p:txBody>
+      </p:sp>
+      <p:sp>
+        <p:nvSpPr>
+          <p:cNvPr id="18" name="Freeform 17"/>
+          <p:cNvSpPr/>
+          <p:nvPr/>
+        </p:nvSpPr>
+        <p:spPr>
+          <a:xfrm>
+            <a:off x="8210176" y="5236883"/>
+            <a:ext cx="1090706" cy="463177"/>
+          </a:xfrm>
+          <a:custGeom>
+            <a:avLst/>
+            <a:gdLst>
+              <a:gd name="connsiteX0" fmla="*/ 1090706 w 1090706"/>
+              <a:gd name="connsiteY0" fmla="*/ 0 h 463177"/>
+              <a:gd name="connsiteX1" fmla="*/ 993589 w 1090706"/>
+              <a:gd name="connsiteY1" fmla="*/ 14941 h 463177"/>
+              <a:gd name="connsiteX2" fmla="*/ 948765 w 1090706"/>
+              <a:gd name="connsiteY2" fmla="*/ 29883 h 463177"/>
+              <a:gd name="connsiteX3" fmla="*/ 926353 w 1090706"/>
+              <a:gd name="connsiteY3" fmla="*/ 37353 h 463177"/>
+              <a:gd name="connsiteX4" fmla="*/ 799353 w 1090706"/>
+              <a:gd name="connsiteY4" fmla="*/ 44824 h 463177"/>
+              <a:gd name="connsiteX5" fmla="*/ 694765 w 1090706"/>
+              <a:gd name="connsiteY5" fmla="*/ 67235 h 463177"/>
+              <a:gd name="connsiteX6" fmla="*/ 649942 w 1090706"/>
+              <a:gd name="connsiteY6" fmla="*/ 82177 h 463177"/>
+              <a:gd name="connsiteX7" fmla="*/ 627530 w 1090706"/>
+              <a:gd name="connsiteY7" fmla="*/ 89647 h 463177"/>
+              <a:gd name="connsiteX8" fmla="*/ 605118 w 1090706"/>
+              <a:gd name="connsiteY8" fmla="*/ 104588 h 463177"/>
+              <a:gd name="connsiteX9" fmla="*/ 590177 w 1090706"/>
+              <a:gd name="connsiteY9" fmla="*/ 119530 h 463177"/>
+              <a:gd name="connsiteX10" fmla="*/ 545353 w 1090706"/>
+              <a:gd name="connsiteY10" fmla="*/ 134471 h 463177"/>
+              <a:gd name="connsiteX11" fmla="*/ 500530 w 1090706"/>
+              <a:gd name="connsiteY11" fmla="*/ 149412 h 463177"/>
+              <a:gd name="connsiteX12" fmla="*/ 440765 w 1090706"/>
+              <a:gd name="connsiteY12" fmla="*/ 164353 h 463177"/>
+              <a:gd name="connsiteX13" fmla="*/ 351118 w 1090706"/>
+              <a:gd name="connsiteY13" fmla="*/ 209177 h 463177"/>
+              <a:gd name="connsiteX14" fmla="*/ 328706 w 1090706"/>
+              <a:gd name="connsiteY14" fmla="*/ 216647 h 463177"/>
+              <a:gd name="connsiteX15" fmla="*/ 261471 w 1090706"/>
+              <a:gd name="connsiteY15" fmla="*/ 254000 h 463177"/>
+              <a:gd name="connsiteX16" fmla="*/ 246530 w 1090706"/>
+              <a:gd name="connsiteY16" fmla="*/ 276412 h 463177"/>
+              <a:gd name="connsiteX17" fmla="*/ 224118 w 1090706"/>
+              <a:gd name="connsiteY17" fmla="*/ 283883 h 463177"/>
+              <a:gd name="connsiteX18" fmla="*/ 179295 w 1090706"/>
+              <a:gd name="connsiteY18" fmla="*/ 306294 h 463177"/>
+              <a:gd name="connsiteX19" fmla="*/ 149412 w 1090706"/>
+              <a:gd name="connsiteY19" fmla="*/ 336177 h 463177"/>
+              <a:gd name="connsiteX20" fmla="*/ 134471 w 1090706"/>
+              <a:gd name="connsiteY20" fmla="*/ 358588 h 463177"/>
+              <a:gd name="connsiteX21" fmla="*/ 104589 w 1090706"/>
+              <a:gd name="connsiteY21" fmla="*/ 366059 h 463177"/>
+              <a:gd name="connsiteX22" fmla="*/ 74706 w 1090706"/>
+              <a:gd name="connsiteY22" fmla="*/ 403412 h 463177"/>
+              <a:gd name="connsiteX23" fmla="*/ 52295 w 1090706"/>
+              <a:gd name="connsiteY23" fmla="*/ 418353 h 463177"/>
+              <a:gd name="connsiteX24" fmla="*/ 37353 w 1090706"/>
+              <a:gd name="connsiteY24" fmla="*/ 433294 h 463177"/>
+              <a:gd name="connsiteX25" fmla="*/ 22412 w 1090706"/>
+              <a:gd name="connsiteY25" fmla="*/ 455706 h 463177"/>
+              <a:gd name="connsiteX26" fmla="*/ 0 w 1090706"/>
+              <a:gd name="connsiteY26" fmla="*/ 463177 h 463177"/>
+            </a:gdLst>
+            <a:ahLst/>
+            <a:cxnLst>
+              <a:cxn ang="0">
+                <a:pos x="connsiteX0" y="connsiteY0"/>
+              </a:cxn>
+              <a:cxn ang="0">
+                <a:pos x="connsiteX1" y="connsiteY1"/>
+              </a:cxn>
+              <a:cxn ang="0">
+                <a:pos x="connsiteX2" y="connsiteY2"/>
+              </a:cxn>
+              <a:cxn ang="0">
+                <a:pos x="connsiteX3" y="connsiteY3"/>
+              </a:cxn>
+              <a:cxn ang="0">
+                <a:pos x="connsiteX4" y="connsiteY4"/>
+              </a:cxn>
+              <a:cxn ang="0">
+                <a:pos x="connsiteX5" y="connsiteY5"/>
+              </a:cxn>
+              <a:cxn ang="0">
+                <a:pos x="connsiteX6" y="connsiteY6"/>
+              </a:cxn>
+              <a:cxn ang="0">
+                <a:pos x="connsiteX7" y="connsiteY7"/>
+              </a:cxn>
+              <a:cxn ang="0">
+                <a:pos x="connsiteX8" y="connsiteY8"/>
+              </a:cxn>
+              <a:cxn ang="0">
+                <a:pos x="connsiteX9" y="connsiteY9"/>
+              </a:cxn>
+              <a:cxn ang="0">
+                <a:pos x="connsiteX10" y="connsiteY10"/>
+              </a:cxn>
+              <a:cxn ang="0">
+                <a:pos x="connsiteX11" y="connsiteY11"/>
+              </a:cxn>
+              <a:cxn ang="0">
+                <a:pos x="connsiteX12" y="connsiteY12"/>
+              </a:cxn>
+              <a:cxn ang="0">
+                <a:pos x="connsiteX13" y="connsiteY13"/>
+              </a:cxn>
+              <a:cxn ang="0">
+                <a:pos x="connsiteX14" y="connsiteY14"/>
+              </a:cxn>
+              <a:cxn ang="0">
+                <a:pos x="connsiteX15" y="connsiteY15"/>
+              </a:cxn>
+              <a:cxn ang="0">
+                <a:pos x="connsiteX16" y="connsiteY16"/>
+              </a:cxn>
+              <a:cxn ang="0">
+                <a:pos x="connsiteX17" y="connsiteY17"/>
+              </a:cxn>
+              <a:cxn ang="0">
+                <a:pos x="connsiteX18" y="connsiteY18"/>
+              </a:cxn>
+              <a:cxn ang="0">
+                <a:pos x="connsiteX19" y="connsiteY19"/>
+              </a:cxn>
+              <a:cxn ang="0">
+                <a:pos x="connsiteX20" y="connsiteY20"/>
+              </a:cxn>
+              <a:cxn ang="0">
+                <a:pos x="connsiteX21" y="connsiteY21"/>
+              </a:cxn>
+              <a:cxn ang="0">
+                <a:pos x="connsiteX22" y="connsiteY22"/>
+              </a:cxn>
+              <a:cxn ang="0">
+                <a:pos x="connsiteX23" y="connsiteY23"/>
+              </a:cxn>
+              <a:cxn ang="0">
+                <a:pos x="connsiteX24" y="connsiteY24"/>
+              </a:cxn>
+              <a:cxn ang="0">
+                <a:pos x="connsiteX25" y="connsiteY25"/>
+              </a:cxn>
+              <a:cxn ang="0">
+                <a:pos x="connsiteX26" y="connsiteY26"/>
+              </a:cxn>
+            </a:cxnLst>
+            <a:rect l="l" t="t" r="r" b="b"/>
+            <a:pathLst>
+              <a:path w="1090706" h="463177">
+                <a:moveTo>
+                  <a:pt x="1090706" y="0"/>
+                </a:moveTo>
+                <a:cubicBezTo>
+                  <a:pt x="1058334" y="4980"/>
+                  <a:pt x="1025640" y="8193"/>
+                  <a:pt x="993589" y="14941"/>
+                </a:cubicBezTo>
+                <a:cubicBezTo>
+                  <a:pt x="978177" y="18186"/>
+                  <a:pt x="963706" y="24903"/>
+                  <a:pt x="948765" y="29883"/>
+                </a:cubicBezTo>
+                <a:cubicBezTo>
+                  <a:pt x="941294" y="32373"/>
+                  <a:pt x="934214" y="36891"/>
+                  <a:pt x="926353" y="37353"/>
+                </a:cubicBezTo>
+                <a:lnTo>
+                  <a:pt x="799353" y="44824"/>
+                </a:lnTo>
+                <a:cubicBezTo>
+                  <a:pt x="735484" y="66114"/>
+                  <a:pt x="770158" y="57812"/>
+                  <a:pt x="694765" y="67235"/>
+                </a:cubicBezTo>
+                <a:lnTo>
+                  <a:pt x="649942" y="82177"/>
+                </a:lnTo>
+                <a:lnTo>
+                  <a:pt x="627530" y="89647"/>
+                </a:lnTo>
+                <a:cubicBezTo>
+                  <a:pt x="620059" y="94627"/>
+                  <a:pt x="612129" y="98979"/>
+                  <a:pt x="605118" y="104588"/>
+                </a:cubicBezTo>
+                <a:cubicBezTo>
+                  <a:pt x="599618" y="108988"/>
+                  <a:pt x="596477" y="116380"/>
+                  <a:pt x="590177" y="119530"/>
+                </a:cubicBezTo>
+                <a:cubicBezTo>
+                  <a:pt x="576090" y="126573"/>
+                  <a:pt x="560294" y="129491"/>
+                  <a:pt x="545353" y="134471"/>
+                </a:cubicBezTo>
+                <a:cubicBezTo>
+                  <a:pt x="530412" y="139451"/>
+                  <a:pt x="515973" y="146323"/>
+                  <a:pt x="500530" y="149412"/>
+                </a:cubicBezTo>
+                <a:cubicBezTo>
+                  <a:pt x="455455" y="158427"/>
+                  <a:pt x="475223" y="152868"/>
+                  <a:pt x="440765" y="164353"/>
+                </a:cubicBezTo>
+                <a:cubicBezTo>
+                  <a:pt x="382841" y="202969"/>
+                  <a:pt x="412975" y="188558"/>
+                  <a:pt x="351118" y="209177"/>
+                </a:cubicBezTo>
+                <a:lnTo>
+                  <a:pt x="328706" y="216647"/>
+                </a:lnTo>
+                <a:cubicBezTo>
+                  <a:pt x="277331" y="250898"/>
+                  <a:pt x="300919" y="240852"/>
+                  <a:pt x="261471" y="254000"/>
+                </a:cubicBezTo>
+                <a:cubicBezTo>
+                  <a:pt x="256491" y="261471"/>
+                  <a:pt x="253541" y="270803"/>
+                  <a:pt x="246530" y="276412"/>
+                </a:cubicBezTo>
+                <a:cubicBezTo>
+                  <a:pt x="240381" y="281331"/>
+                  <a:pt x="231161" y="280361"/>
+                  <a:pt x="224118" y="283883"/>
+                </a:cubicBezTo>
+                <a:cubicBezTo>
+                  <a:pt x="166195" y="312844"/>
+                  <a:pt x="235621" y="287519"/>
+                  <a:pt x="179295" y="306294"/>
+                </a:cubicBezTo>
+                <a:cubicBezTo>
+                  <a:pt x="169334" y="316255"/>
+                  <a:pt x="157226" y="324456"/>
+                  <a:pt x="149412" y="336177"/>
+                </a:cubicBezTo>
+                <a:cubicBezTo>
+                  <a:pt x="144432" y="343647"/>
+                  <a:pt x="141941" y="353608"/>
+                  <a:pt x="134471" y="358588"/>
+                </a:cubicBezTo>
+                <a:cubicBezTo>
+                  <a:pt x="125928" y="364283"/>
+                  <a:pt x="114550" y="363569"/>
+                  <a:pt x="104589" y="366059"/>
+                </a:cubicBezTo>
+                <a:cubicBezTo>
+                  <a:pt x="40363" y="408875"/>
+                  <a:pt x="115943" y="351865"/>
+                  <a:pt x="74706" y="403412"/>
+                </a:cubicBezTo>
+                <a:cubicBezTo>
+                  <a:pt x="69097" y="410423"/>
+                  <a:pt x="59306" y="412744"/>
+                  <a:pt x="52295" y="418353"/>
+                </a:cubicBezTo>
+                <a:cubicBezTo>
+                  <a:pt x="46795" y="422753"/>
+                  <a:pt x="41753" y="427794"/>
+                  <a:pt x="37353" y="433294"/>
+                </a:cubicBezTo>
+                <a:cubicBezTo>
+                  <a:pt x="31744" y="440305"/>
+                  <a:pt x="29423" y="450097"/>
+                  <a:pt x="22412" y="455706"/>
+                </a:cubicBezTo>
+                <a:cubicBezTo>
+                  <a:pt x="16263" y="460625"/>
+                  <a:pt x="0" y="463177"/>
+                  <a:pt x="0" y="463177"/>
+                </a:cubicBezTo>
+              </a:path>
+            </a:pathLst>
+          </a:custGeom>
+          <a:ln w="38100" cmpd="sng">
+            <a:solidFill>
+              <a:schemeClr val="accent4">
+                <a:alpha val="50000"/>
+              </a:schemeClr>
+            </a:solidFill>
+          </a:ln>
+        </p:spPr>
+        <p:style>
+          <a:lnRef idx="2">
+            <a:schemeClr val="accent1"/>
+          </a:lnRef>
+          <a:fillRef idx="0">
+            <a:schemeClr val="accent1"/>
+          </a:fillRef>
+          <a:effectRef idx="1">
+            <a:schemeClr val="accent1"/>
+          </a:effectRef>
+          <a:fontRef idx="minor">
+            <a:schemeClr val="tx1"/>
+          </a:fontRef>
+        </p:style>
+        <p:txBody>
+          <a:bodyPr rtlCol="0" anchor="ctr"/>
+          <a:lstStyle/>
+          <a:p>
+            <a:pPr algn="ctr"/>
+            <a:endParaRPr lang="en-US"/>
           </a:p>
         </p:txBody>
       </p:sp>
@@ -15397,6 +17923,527 @@
 </file>
 
 <file path=ppt/slides/slide24.xml><?xml version="1.0" encoding="utf-8"?>
+<p:sld xmlns:a="http://schemas.openxmlformats.org/drawingml/2006/main" xmlns:r="http://schemas.openxmlformats.org/officeDocument/2006/relationships" xmlns:p="http://schemas.openxmlformats.org/presentationml/2006/main">
+  <p:cSld>
+    <p:spTree>
+      <p:nvGrpSpPr>
+        <p:cNvPr id="1" name=""/>
+        <p:cNvGrpSpPr/>
+        <p:nvPr/>
+      </p:nvGrpSpPr>
+      <p:grpSpPr>
+        <a:xfrm>
+          <a:off x="0" y="0"/>
+          <a:ext cx="0" cy="0"/>
+          <a:chOff x="0" y="0"/>
+          <a:chExt cx="0" cy="0"/>
+        </a:xfrm>
+      </p:grpSpPr>
+      <p:sp>
+        <p:nvSpPr>
+          <p:cNvPr id="2" name="Title 1"/>
+          <p:cNvSpPr>
+            <a:spLocks noGrp="1"/>
+          </p:cNvSpPr>
+          <p:nvPr>
+            <p:ph type="title"/>
+          </p:nvPr>
+        </p:nvSpPr>
+        <p:spPr>
+          <a:xfrm>
+            <a:off x="838200" y="365126"/>
+            <a:ext cx="10515600" cy="815228"/>
+          </a:xfrm>
+        </p:spPr>
+        <p:txBody>
+          <a:bodyPr>
+            <a:normAutofit/>
+          </a:bodyPr>
+          <a:lstStyle/>
+          <a:p>
+            <a:r>
+              <a:rPr lang="en-US" sz="3600" b="1" dirty="0" smtClean="0">
+                <a:solidFill>
+                  <a:srgbClr val="2E75B6"/>
+                </a:solidFill>
+                <a:latin typeface="Arial"/>
+                <a:cs typeface="Arial"/>
+              </a:rPr>
+              <a:t>Summary</a:t>
+            </a:r>
+            <a:endParaRPr lang="en-US" sz="3600" b="1" dirty="0">
+              <a:solidFill>
+                <a:srgbClr val="2E75B6"/>
+              </a:solidFill>
+              <a:latin typeface="Arial"/>
+              <a:cs typeface="Arial"/>
+            </a:endParaRPr>
+          </a:p>
+        </p:txBody>
+      </p:sp>
+      <p:sp>
+        <p:nvSpPr>
+          <p:cNvPr id="3" name="Content Placeholder 2"/>
+          <p:cNvSpPr>
+            <a:spLocks noGrp="1"/>
+          </p:cNvSpPr>
+          <p:nvPr>
+            <p:ph idx="1"/>
+          </p:nvPr>
+        </p:nvSpPr>
+        <p:spPr>
+          <a:xfrm>
+            <a:off x="838200" y="1419412"/>
+            <a:ext cx="10515600" cy="4757551"/>
+          </a:xfrm>
+        </p:spPr>
+        <p:txBody>
+          <a:bodyPr>
+            <a:normAutofit/>
+          </a:bodyPr>
+          <a:lstStyle/>
+          <a:p>
+            <a:r>
+              <a:rPr lang="en-US" sz="2400" dirty="0" smtClean="0">
+                <a:latin typeface="Arial"/>
+                <a:cs typeface="Arial"/>
+              </a:rPr>
+              <a:t>Average </a:t>
+            </a:r>
+            <a:r>
+              <a:rPr lang="en-US" sz="2400" dirty="0" err="1" smtClean="0">
+                <a:latin typeface="Arial"/>
+                <a:cs typeface="Arial"/>
+              </a:rPr>
+              <a:t>LSE:minLSE</a:t>
+            </a:r>
+            <a:r>
+              <a:rPr lang="en-US" sz="2400" dirty="0" smtClean="0">
+                <a:latin typeface="Arial"/>
+                <a:cs typeface="Arial"/>
+              </a:rPr>
+              <a:t> for DB networks was lower than ratio for 30 random networks</a:t>
+            </a:r>
+          </a:p>
+          <a:p>
+            <a:endParaRPr lang="en-US" sz="2400" dirty="0" smtClean="0">
+              <a:latin typeface="Arial"/>
+              <a:cs typeface="Arial"/>
+            </a:endParaRPr>
+          </a:p>
+          <a:p>
+            <a:r>
+              <a:rPr lang="en-US" sz="2400" dirty="0" err="1" smtClean="0">
+                <a:latin typeface="Arial"/>
+                <a:cs typeface="Arial"/>
+              </a:rPr>
+              <a:t>LSE:minLSE</a:t>
+            </a:r>
+            <a:r>
+              <a:rPr lang="en-US" sz="2400" dirty="0" smtClean="0">
+                <a:latin typeface="Arial"/>
+                <a:cs typeface="Arial"/>
+              </a:rPr>
+              <a:t> ratio for DB5 network was less than the average </a:t>
+            </a:r>
+            <a:r>
+              <a:rPr lang="en-US" sz="2400" dirty="0" err="1" smtClean="0">
+                <a:latin typeface="Arial"/>
+                <a:cs typeface="Arial"/>
+              </a:rPr>
+              <a:t>LSE:minLSE</a:t>
+            </a:r>
+            <a:r>
+              <a:rPr lang="en-US" sz="2400" dirty="0" smtClean="0">
+                <a:latin typeface="Arial"/>
+                <a:cs typeface="Arial"/>
+              </a:rPr>
+              <a:t> ratio for 30 random networks</a:t>
+            </a:r>
+          </a:p>
+          <a:p>
+            <a:endParaRPr lang="en-US" sz="2400" dirty="0">
+              <a:latin typeface="Arial"/>
+              <a:cs typeface="Arial"/>
+            </a:endParaRPr>
+          </a:p>
+          <a:p>
+            <a:r>
+              <a:rPr lang="en-US" sz="2400" dirty="0" smtClean="0">
+                <a:latin typeface="Arial"/>
+                <a:cs typeface="Arial"/>
+              </a:rPr>
+              <a:t>Random networks that performed better in the model shared more regulatory relationships with the DB5 network than those random networks that performed worse</a:t>
+            </a:r>
+            <a:endParaRPr lang="en-US" sz="2400" dirty="0">
+              <a:latin typeface="Arial"/>
+              <a:cs typeface="Arial"/>
+            </a:endParaRPr>
+          </a:p>
+        </p:txBody>
+      </p:sp>
+    </p:spTree>
+    <p:extLst>
+      <p:ext uri="{BB962C8B-B14F-4D97-AF65-F5344CB8AC3E}">
+        <p14:creationId xmlns:p14="http://schemas.microsoft.com/office/powerpoint/2010/main" val="2978400950"/>
+      </p:ext>
+    </p:extLst>
+  </p:cSld>
+  <p:clrMapOvr>
+    <a:masterClrMapping/>
+  </p:clrMapOvr>
+</p:sld>
+</file>
+
+<file path=ppt/slides/slide25.xml><?xml version="1.0" encoding="utf-8"?>
+<p:sld xmlns:a="http://schemas.openxmlformats.org/drawingml/2006/main" xmlns:r="http://schemas.openxmlformats.org/officeDocument/2006/relationships" xmlns:p="http://schemas.openxmlformats.org/presentationml/2006/main">
+  <p:cSld>
+    <p:spTree>
+      <p:nvGrpSpPr>
+        <p:cNvPr id="1" name=""/>
+        <p:cNvGrpSpPr/>
+        <p:nvPr/>
+      </p:nvGrpSpPr>
+      <p:grpSpPr>
+        <a:xfrm>
+          <a:off x="0" y="0"/>
+          <a:ext cx="0" cy="0"/>
+          <a:chOff x="0" y="0"/>
+          <a:chExt cx="0" cy="0"/>
+        </a:xfrm>
+      </p:grpSpPr>
+      <p:sp>
+        <p:nvSpPr>
+          <p:cNvPr id="2" name="Title 1"/>
+          <p:cNvSpPr>
+            <a:spLocks noGrp="1"/>
+          </p:cNvSpPr>
+          <p:nvPr>
+            <p:ph type="title"/>
+          </p:nvPr>
+        </p:nvSpPr>
+        <p:spPr>
+          <a:xfrm>
+            <a:off x="855837" y="0"/>
+            <a:ext cx="10515600" cy="640421"/>
+          </a:xfrm>
+        </p:spPr>
+        <p:txBody>
+          <a:bodyPr>
+            <a:normAutofit fontScale="90000"/>
+          </a:bodyPr>
+          <a:lstStyle/>
+          <a:p>
+            <a:r>
+              <a:rPr lang="en-US" sz="3600" b="1" dirty="0" smtClean="0">
+                <a:latin typeface="Arial"/>
+                <a:cs typeface="Arial"/>
+              </a:rPr>
+              <a:t/>
+            </a:r>
+            <a:br>
+              <a:rPr lang="en-US" sz="3600" b="1" dirty="0" smtClean="0">
+                <a:latin typeface="Arial"/>
+                <a:cs typeface="Arial"/>
+              </a:rPr>
+            </a:br>
+            <a:r>
+              <a:rPr lang="en-US" sz="3600" b="1" dirty="0" smtClean="0">
+                <a:solidFill>
+                  <a:schemeClr val="accent1">
+                    <a:lumMod val="75000"/>
+                  </a:schemeClr>
+                </a:solidFill>
+                <a:latin typeface="Arial"/>
+                <a:cs typeface="Arial"/>
+              </a:rPr>
+              <a:t>Acknowledgments</a:t>
+            </a:r>
+            <a:endParaRPr lang="en-US" sz="3600" b="1" dirty="0">
+              <a:solidFill>
+                <a:schemeClr val="accent1">
+                  <a:lumMod val="75000"/>
+                </a:schemeClr>
+              </a:solidFill>
+              <a:latin typeface="Arial"/>
+              <a:cs typeface="Arial"/>
+            </a:endParaRPr>
+          </a:p>
+        </p:txBody>
+      </p:sp>
+      <p:sp>
+        <p:nvSpPr>
+          <p:cNvPr id="3" name="Content Placeholder 2"/>
+          <p:cNvSpPr>
+            <a:spLocks noGrp="1"/>
+          </p:cNvSpPr>
+          <p:nvPr>
+            <p:ph idx="1"/>
+          </p:nvPr>
+        </p:nvSpPr>
+        <p:spPr>
+          <a:xfrm>
+            <a:off x="838200" y="1076111"/>
+            <a:ext cx="10515600" cy="5100852"/>
+          </a:xfrm>
+        </p:spPr>
+        <p:txBody>
+          <a:bodyPr/>
+          <a:lstStyle/>
+          <a:p>
+            <a:r>
+              <a:rPr lang="en-US" dirty="0" smtClean="0"/>
+              <a:t>Dr. </a:t>
+            </a:r>
+            <a:r>
+              <a:rPr lang="en-US" dirty="0" err="1" smtClean="0"/>
+              <a:t>Kam</a:t>
+            </a:r>
+            <a:r>
+              <a:rPr lang="en-US" dirty="0" smtClean="0"/>
+              <a:t> </a:t>
+            </a:r>
+            <a:r>
+              <a:rPr lang="en-US" dirty="0" err="1" smtClean="0"/>
+              <a:t>Dahlquist</a:t>
+            </a:r>
+            <a:r>
+              <a:rPr lang="en-US" dirty="0" smtClean="0"/>
+              <a:t> and Dr. Ben Fitzpatrick</a:t>
+            </a:r>
+          </a:p>
+          <a:p>
+            <a:r>
+              <a:rPr lang="en-US" b="1" dirty="0" err="1" smtClean="0"/>
+              <a:t>GRNmap</a:t>
+            </a:r>
+            <a:r>
+              <a:rPr lang="en-US" b="1" dirty="0" smtClean="0"/>
+              <a:t> data analysis current team</a:t>
+            </a:r>
+            <a:r>
+              <a:rPr lang="en-US" dirty="0" smtClean="0"/>
+              <a:t>: </a:t>
+            </a:r>
+            <a:r>
+              <a:rPr lang="en-US" sz="2400" dirty="0" smtClean="0"/>
+              <a:t>Brandon Klein, Kristen </a:t>
+            </a:r>
+            <a:r>
+              <a:rPr lang="en-US" sz="2400" dirty="0" err="1" smtClean="0"/>
+              <a:t>Horstmann</a:t>
+            </a:r>
+            <a:r>
+              <a:rPr lang="en-US" sz="2400" dirty="0" smtClean="0"/>
+              <a:t>, and Maggie O’Neil</a:t>
+            </a:r>
+          </a:p>
+          <a:p>
+            <a:r>
+              <a:rPr lang="en-US" b="1" dirty="0" err="1" smtClean="0"/>
+              <a:t>GRNmap</a:t>
+            </a:r>
+            <a:r>
+              <a:rPr lang="en-US" b="1" dirty="0" smtClean="0"/>
+              <a:t> current coding team</a:t>
+            </a:r>
+            <a:r>
+              <a:rPr lang="en-US" dirty="0" smtClean="0"/>
+              <a:t>: </a:t>
+            </a:r>
+            <a:r>
+              <a:rPr lang="en-US" sz="2400" dirty="0" smtClean="0"/>
+              <a:t>Trixie A. </a:t>
+            </a:r>
+            <a:r>
+              <a:rPr lang="en-US" sz="2400" dirty="0" err="1" smtClean="0"/>
+              <a:t>Roque</a:t>
+            </a:r>
+            <a:r>
+              <a:rPr lang="en-US" sz="2400" dirty="0" smtClean="0"/>
+              <a:t>, </a:t>
+            </a:r>
+            <a:r>
+              <a:rPr lang="en-US" sz="2400" dirty="0" err="1" smtClean="0"/>
+              <a:t>Chukwuemeka</a:t>
+            </a:r>
+            <a:r>
+              <a:rPr lang="en-US" sz="2400" dirty="0" smtClean="0"/>
+              <a:t> (Edward) </a:t>
+            </a:r>
+            <a:r>
+              <a:rPr lang="en-US" sz="2400" dirty="0" err="1" smtClean="0"/>
+              <a:t>Azinge</a:t>
+            </a:r>
+            <a:r>
+              <a:rPr lang="en-US" sz="2400" dirty="0" smtClean="0"/>
+              <a:t>, and Justin Torres</a:t>
+            </a:r>
+          </a:p>
+          <a:p>
+            <a:r>
+              <a:rPr lang="en-US" b="1" dirty="0" err="1" smtClean="0"/>
+              <a:t>GRNsight</a:t>
+            </a:r>
+            <a:r>
+              <a:rPr lang="en-US" b="1" dirty="0" smtClean="0"/>
+              <a:t> current team</a:t>
+            </a:r>
+            <a:r>
+              <a:rPr lang="en-US" dirty="0" smtClean="0"/>
+              <a:t>: </a:t>
+            </a:r>
+            <a:r>
+              <a:rPr lang="en-US" sz="2400" dirty="0" err="1" smtClean="0"/>
+              <a:t>Anindita</a:t>
+            </a:r>
+            <a:r>
+              <a:rPr lang="en-US" sz="2400" dirty="0" smtClean="0"/>
+              <a:t> </a:t>
+            </a:r>
+            <a:r>
+              <a:rPr lang="en-US" sz="2400" dirty="0" err="1" smtClean="0"/>
+              <a:t>Varshneya</a:t>
+            </a:r>
+            <a:r>
+              <a:rPr lang="en-US" sz="2400" dirty="0" smtClean="0"/>
+              <a:t>, Nicole A. </a:t>
+            </a:r>
+            <a:r>
+              <a:rPr lang="en-US" sz="2400" dirty="0" err="1" smtClean="0"/>
+              <a:t>Anguiano</a:t>
+            </a:r>
+            <a:r>
+              <a:rPr lang="en-US" sz="2400" dirty="0" smtClean="0"/>
+              <a:t>, </a:t>
+            </a:r>
+            <a:r>
+              <a:rPr lang="en-US" sz="2400" dirty="0" err="1" smtClean="0"/>
+              <a:t>Mihir</a:t>
+            </a:r>
+            <a:r>
+              <a:rPr lang="en-US" sz="2400" dirty="0" smtClean="0"/>
+              <a:t> </a:t>
+            </a:r>
+            <a:r>
+              <a:rPr lang="en-US" sz="2400" dirty="0" err="1" smtClean="0"/>
+              <a:t>Samdarshi</a:t>
+            </a:r>
+            <a:r>
+              <a:rPr lang="en-US" sz="2400" dirty="0" smtClean="0"/>
+              <a:t>, Eileen </a:t>
+            </a:r>
+            <a:r>
+              <a:rPr lang="en-US" sz="2400" dirty="0" err="1" smtClean="0"/>
+              <a:t>Choe</a:t>
+            </a:r>
+            <a:r>
+              <a:rPr lang="en-US" sz="2400" dirty="0" smtClean="0"/>
+              <a:t>, and Edward </a:t>
+            </a:r>
+            <a:r>
+              <a:rPr lang="en-US" sz="2400" dirty="0" err="1" smtClean="0"/>
+              <a:t>Bachoura</a:t>
+            </a:r>
+            <a:r>
+              <a:rPr lang="en-US" sz="2400" dirty="0" smtClean="0"/>
+              <a:t>, Jen Shin</a:t>
+            </a:r>
+          </a:p>
+          <a:p>
+            <a:endParaRPr lang="en-US" dirty="0" smtClean="0"/>
+          </a:p>
+          <a:p>
+            <a:endParaRPr lang="en-US" dirty="0"/>
+          </a:p>
+        </p:txBody>
+      </p:sp>
+      <p:pic>
+        <p:nvPicPr>
+          <p:cNvPr id="4" name="Picture 3"/>
+          <p:cNvPicPr>
+            <a:picLocks noChangeAspect="1"/>
+          </p:cNvPicPr>
+          <p:nvPr/>
+        </p:nvPicPr>
+        <p:blipFill>
+          <a:blip r:embed="rId2"/>
+          <a:stretch>
+            <a:fillRect/>
+          </a:stretch>
+        </p:blipFill>
+        <p:spPr>
+          <a:xfrm>
+            <a:off x="788089" y="4506805"/>
+            <a:ext cx="3003998" cy="1624435"/>
+          </a:xfrm>
+          <a:prstGeom prst="rect">
+            <a:avLst/>
+          </a:prstGeom>
+        </p:spPr>
+      </p:pic>
+      <p:pic>
+        <p:nvPicPr>
+          <p:cNvPr id="5" name="Picture 4"/>
+          <p:cNvPicPr>
+            <a:picLocks noChangeAspect="1"/>
+          </p:cNvPicPr>
+          <p:nvPr/>
+        </p:nvPicPr>
+        <p:blipFill>
+          <a:blip r:embed="rId3"/>
+          <a:stretch>
+            <a:fillRect/>
+          </a:stretch>
+        </p:blipFill>
+        <p:spPr>
+          <a:xfrm>
+            <a:off x="9017374" y="3898695"/>
+            <a:ext cx="2712328" cy="2712328"/>
+          </a:xfrm>
+          <a:prstGeom prst="rect">
+            <a:avLst/>
+          </a:prstGeom>
+        </p:spPr>
+      </p:pic>
+      <p:pic>
+        <p:nvPicPr>
+          <p:cNvPr id="6" name="Picture 5"/>
+          <p:cNvPicPr>
+            <a:picLocks noChangeAspect="1"/>
+          </p:cNvPicPr>
+          <p:nvPr/>
+        </p:nvPicPr>
+        <p:blipFill>
+          <a:blip r:embed="rId4"/>
+          <a:stretch>
+            <a:fillRect/>
+          </a:stretch>
+        </p:blipFill>
+        <p:spPr>
+          <a:xfrm>
+            <a:off x="5242626" y="4304441"/>
+            <a:ext cx="2124085" cy="2124085"/>
+          </a:xfrm>
+          <a:prstGeom prst="rect">
+            <a:avLst/>
+          </a:prstGeom>
+        </p:spPr>
+      </p:pic>
+    </p:spTree>
+    <p:extLst>
+      <p:ext uri="{BB962C8B-B14F-4D97-AF65-F5344CB8AC3E}">
+        <p14:creationId xmlns:p14="http://schemas.microsoft.com/office/powerpoint/2010/main" val="4147385960"/>
+      </p:ext>
+    </p:extLst>
+  </p:cSld>
+  <p:clrMapOvr>
+    <a:masterClrMapping/>
+  </p:clrMapOvr>
+</p:sld>
+</file>
+
+<file path=ppt/slides/slide26.xml><?xml version="1.0" encoding="utf-8"?>
 <p:sld xmlns:a="http://schemas.openxmlformats.org/drawingml/2006/main" xmlns:r="http://schemas.openxmlformats.org/officeDocument/2006/relationships" xmlns:p="http://schemas.openxmlformats.org/presentationml/2006/main">
   <p:cSld>
     <p:spTree>
@@ -17978,8 +21025,8 @@
             </a:pPr>
             <a:r>
               <a:rPr lang="en-US" sz="2000" b="1" dirty="0">
-                <a:latin typeface="Century Gothic"/>
-                <a:cs typeface="Century Gothic"/>
+                <a:latin typeface="Arial"/>
+                <a:cs typeface="Arial"/>
               </a:rPr>
               <a:t>1. Which transcription factors regulate the cold shock response in yeast? </a:t>
             </a:r>
@@ -17989,8 +21036,8 @@
               <a:buNone/>
             </a:pPr>
             <a:endParaRPr lang="en-US" sz="2000" b="1" dirty="0">
-              <a:latin typeface="Century Gothic"/>
-              <a:cs typeface="Century Gothic"/>
+              <a:latin typeface="Arial"/>
+              <a:cs typeface="Arial"/>
             </a:endParaRPr>
           </a:p>
           <a:p>
@@ -17999,8 +21046,8 @@
             </a:pPr>
             <a:r>
               <a:rPr lang="en-US" sz="2000" b="1" dirty="0">
-                <a:latin typeface="Century Gothic"/>
-                <a:cs typeface="Century Gothic"/>
+                <a:latin typeface="Arial"/>
+                <a:cs typeface="Arial"/>
               </a:rPr>
               <a:t>2. What is the indirect effect of other transcription factors?</a:t>
             </a:r>
@@ -18010,8 +21057,8 @@
               <a:buAutoNum type="arabicPeriod"/>
             </a:pPr>
             <a:endParaRPr lang="en-US" sz="2000" b="1" dirty="0">
-              <a:latin typeface="Century Gothic"/>
-              <a:cs typeface="Century Gothic"/>
+              <a:latin typeface="Arial"/>
+              <a:cs typeface="Arial"/>
             </a:endParaRPr>
           </a:p>
           <a:p>
@@ -18020,8 +21067,8 @@
             </a:pPr>
             <a:r>
               <a:rPr lang="en-US" sz="2000" b="1" dirty="0">
-                <a:latin typeface="Century Gothic"/>
-                <a:cs typeface="Century Gothic"/>
+                <a:latin typeface="Arial"/>
+                <a:cs typeface="Arial"/>
               </a:rPr>
               <a:t>3. Can we make predictions based on our understanding of            the network? </a:t>
             </a:r>
@@ -18031,8 +21078,8 @@
               <a:buNone/>
             </a:pPr>
             <a:endParaRPr lang="en-US" sz="2000" b="1" dirty="0">
-              <a:latin typeface="Century Gothic"/>
-              <a:cs typeface="Century Gothic"/>
+              <a:latin typeface="Arial"/>
+              <a:cs typeface="Arial"/>
             </a:endParaRPr>
           </a:p>
           <a:p>
@@ -18040,8 +21087,8 @@
               <a:buNone/>
             </a:pPr>
             <a:endParaRPr lang="en-US" sz="2000" dirty="0">
-              <a:latin typeface="Century Gothic"/>
-              <a:cs typeface="Century Gothic"/>
+              <a:latin typeface="Arial"/>
+              <a:cs typeface="Arial"/>
             </a:endParaRPr>
           </a:p>
         </p:txBody>
@@ -18645,7 +21692,7 @@
   <a:extraClrSchemeLst/>
   <a:extLst>
     <a:ext uri="{05A4C25C-085E-4340-85A3-A5531E510DB2}">
-      <thm15:themeFamily xmlns="" xmlns:thm15="http://schemas.microsoft.com/office/thememl/2012/main" name="Office Theme" id="{62F939B6-93AF-4DB8-9C6B-D6C7DFDC589F}" vid="{4A3C46E8-61CC-4603-A589-7422A47A8E4A}"/>
+      <thm15:themeFamily xmlns:thm15="http://schemas.microsoft.com/office/thememl/2012/main" xmlns="" name="Office Theme" id="{62F939B6-93AF-4DB8-9C6B-D6C7DFDC589F}" vid="{4A3C46E8-61CC-4603-A589-7422A47A8E4A}"/>
     </a:ext>
   </a:extLst>
 </a:theme>
@@ -18906,7 +21953,7 @@
   <a:extraClrSchemeLst/>
   <a:extLst>
     <a:ext uri="{05A4C25C-085E-4340-85A3-A5531E510DB2}">
-      <thm15:themeFamily xmlns="" xmlns:thm15="http://schemas.microsoft.com/office/thememl/2012/main" name="Office Theme" id="{62F939B6-93AF-4DB8-9C6B-D6C7DFDC589F}" vid="{4A3C46E8-61CC-4603-A589-7422A47A8E4A}"/>
+      <thm15:themeFamily xmlns:thm15="http://schemas.microsoft.com/office/thememl/2012/main" xmlns="" name="Office Theme" id="{62F939B6-93AF-4DB8-9C6B-D6C7DFDC589F}" vid="{4A3C46E8-61CC-4603-A589-7422A47A8E4A}"/>
     </a:ext>
   </a:extLst>
 </a:theme>

</xml_diff>